<commit_message>
Better attribution of pcaps and minor visual changes to exercise slides.
</commit_message>
<xml_diff>
--- a/Packet_Analysis_Exercise_Answers.pptx
+++ b/Packet_Analysis_Exercise_Answers.pptx
@@ -224,838 +224,43 @@
 <file path=ppt/changesInfos/changesInfo1.xml><?xml version="1.0" encoding="utf-8"?>
 <pc:chgInfo xmlns:a="http://schemas.openxmlformats.org/drawingml/2006/main" xmlns:r="http://schemas.openxmlformats.org/officeDocument/2006/relationships" xmlns:ac="http://schemas.microsoft.com/office/drawing/2013/main/command" xmlns:pc="http://schemas.microsoft.com/office/powerpoint/2013/main/command">
   <pc:docChgLst>
+    <pc:chgData name="Stephen Deck" userId="d0abce2a322c43a5" providerId="LiveId" clId="{211B39A6-E072-4128-88F4-ED3610BCC087}"/>
+    <pc:docChg chg="custSel addSld delSld modSld sldOrd modSection">
+      <pc:chgData name="Stephen Deck" userId="d0abce2a322c43a5" providerId="LiveId" clId="{211B39A6-E072-4128-88F4-ED3610BCC087}" dt="2018-04-24T00:56:01.965" v="4"/>
+      <pc:docMkLst>
+        <pc:docMk/>
+      </pc:docMkLst>
+      <pc:sldChg chg="modSp">
+        <pc:chgData name="Stephen Deck" userId="d0abce2a322c43a5" providerId="LiveId" clId="{211B39A6-E072-4128-88F4-ED3610BCC087}" dt="2018-04-23T23:34:52.879" v="1" actId="27636"/>
+        <pc:sldMkLst>
+          <pc:docMk/>
+          <pc:sldMk cId="439708885" sldId="444"/>
+        </pc:sldMkLst>
+        <pc:spChg chg="mod">
+          <ac:chgData name="Stephen Deck" userId="d0abce2a322c43a5" providerId="LiveId" clId="{211B39A6-E072-4128-88F4-ED3610BCC087}" dt="2018-04-23T23:34:52.879" v="1" actId="27636"/>
+          <ac:spMkLst>
+            <pc:docMk/>
+            <pc:sldMk cId="439708885" sldId="444"/>
+            <ac:spMk id="11" creationId="{CF03DFB5-5A8F-427E-98CE-C343A2ACF58A}"/>
+          </ac:spMkLst>
+        </pc:spChg>
+      </pc:sldChg>
+      <pc:sldChg chg="add del ord">
+        <pc:chgData name="Stephen Deck" userId="d0abce2a322c43a5" providerId="LiveId" clId="{211B39A6-E072-4128-88F4-ED3610BCC087}" dt="2018-04-24T00:56:01.965" v="4"/>
+        <pc:sldMkLst>
+          <pc:docMk/>
+          <pc:sldMk cId="4107462780" sldId="449"/>
+        </pc:sldMkLst>
+      </pc:sldChg>
+    </pc:docChg>
+  </pc:docChgLst>
+  <pc:docChgLst>
     <pc:chgData name="Stephen Deck" userId="d0abce2a322c43a5" providerId="LiveId" clId="{ADFD2B2D-6693-472B-9AA3-4F1E67DE2D0B}"/>
     <pc:docChg chg="undo custSel delSld modSld modSection">
       <pc:chgData name="Stephen Deck" userId="d0abce2a322c43a5" providerId="LiveId" clId="{ADFD2B2D-6693-472B-9AA3-4F1E67DE2D0B}" dt="2018-04-22T14:44:21.785" v="291" actId="2696"/>
       <pc:docMkLst>
         <pc:docMk/>
       </pc:docMkLst>
-      <pc:sldChg chg="del">
-        <pc:chgData name="Stephen Deck" userId="d0abce2a322c43a5" providerId="LiveId" clId="{ADFD2B2D-6693-472B-9AA3-4F1E67DE2D0B}" dt="2018-04-22T14:40:31.891" v="0" actId="2696"/>
-        <pc:sldMkLst>
-          <pc:docMk/>
-          <pc:sldMk cId="1572080917" sldId="257"/>
-        </pc:sldMkLst>
-      </pc:sldChg>
-      <pc:sldChg chg="del">
-        <pc:chgData name="Stephen Deck" userId="d0abce2a322c43a5" providerId="LiveId" clId="{ADFD2B2D-6693-472B-9AA3-4F1E67DE2D0B}" dt="2018-04-22T14:40:31.955" v="3" actId="2696"/>
-        <pc:sldMkLst>
-          <pc:docMk/>
-          <pc:sldMk cId="165294115" sldId="260"/>
-        </pc:sldMkLst>
-      </pc:sldChg>
-      <pc:sldChg chg="del">
-        <pc:chgData name="Stephen Deck" userId="d0abce2a322c43a5" providerId="LiveId" clId="{ADFD2B2D-6693-472B-9AA3-4F1E67DE2D0B}" dt="2018-04-22T14:44:21.785" v="291" actId="2696"/>
-        <pc:sldMkLst>
-          <pc:docMk/>
-          <pc:sldMk cId="378311860" sldId="266"/>
-        </pc:sldMkLst>
-      </pc:sldChg>
-      <pc:sldChg chg="del">
-        <pc:chgData name="Stephen Deck" userId="d0abce2a322c43a5" providerId="LiveId" clId="{ADFD2B2D-6693-472B-9AA3-4F1E67DE2D0B}" dt="2018-04-22T14:42:45.925" v="115" actId="2696"/>
-        <pc:sldMkLst>
-          <pc:docMk/>
-          <pc:sldMk cId="1335843847" sldId="271"/>
-        </pc:sldMkLst>
-      </pc:sldChg>
-      <pc:sldChg chg="del">
-        <pc:chgData name="Stephen Deck" userId="d0abce2a322c43a5" providerId="LiveId" clId="{ADFD2B2D-6693-472B-9AA3-4F1E67DE2D0B}" dt="2018-04-22T14:41:25.974" v="61" actId="2696"/>
-        <pc:sldMkLst>
-          <pc:docMk/>
-          <pc:sldMk cId="3003349192" sldId="272"/>
-        </pc:sldMkLst>
-      </pc:sldChg>
-      <pc:sldChg chg="del">
-        <pc:chgData name="Stephen Deck" userId="d0abce2a322c43a5" providerId="LiveId" clId="{ADFD2B2D-6693-472B-9AA3-4F1E67DE2D0B}" dt="2018-04-22T14:40:31.907" v="1" actId="2696"/>
-        <pc:sldMkLst>
-          <pc:docMk/>
-          <pc:sldMk cId="2863405215" sldId="273"/>
-        </pc:sldMkLst>
-      </pc:sldChg>
-      <pc:sldChg chg="del">
-        <pc:chgData name="Stephen Deck" userId="d0abce2a322c43a5" providerId="LiveId" clId="{ADFD2B2D-6693-472B-9AA3-4F1E67DE2D0B}" dt="2018-04-22T14:40:31.932" v="2" actId="2696"/>
-        <pc:sldMkLst>
-          <pc:docMk/>
-          <pc:sldMk cId="3870661452" sldId="274"/>
-        </pc:sldMkLst>
-      </pc:sldChg>
-      <pc:sldChg chg="del">
-        <pc:chgData name="Stephen Deck" userId="d0abce2a322c43a5" providerId="LiveId" clId="{ADFD2B2D-6693-472B-9AA3-4F1E67DE2D0B}" dt="2018-04-22T14:41:25.957" v="60" actId="2696"/>
-        <pc:sldMkLst>
-          <pc:docMk/>
-          <pc:sldMk cId="1027322276" sldId="275"/>
-        </pc:sldMkLst>
-      </pc:sldChg>
-      <pc:sldChg chg="del">
-        <pc:chgData name="Stephen Deck" userId="d0abce2a322c43a5" providerId="LiveId" clId="{ADFD2B2D-6693-472B-9AA3-4F1E67DE2D0B}" dt="2018-04-22T14:42:45.908" v="114" actId="2696"/>
-        <pc:sldMkLst>
-          <pc:docMk/>
-          <pc:sldMk cId="2614892075" sldId="276"/>
-        </pc:sldMkLst>
-      </pc:sldChg>
-      <pc:sldChg chg="del">
-        <pc:chgData name="Stephen Deck" userId="d0abce2a322c43a5" providerId="LiveId" clId="{ADFD2B2D-6693-472B-9AA3-4F1E67DE2D0B}" dt="2018-04-22T14:40:32.079" v="5" actId="2696"/>
-        <pc:sldMkLst>
-          <pc:docMk/>
-          <pc:sldMk cId="2050610575" sldId="278"/>
-        </pc:sldMkLst>
-      </pc:sldChg>
-      <pc:sldChg chg="del">
-        <pc:chgData name="Stephen Deck" userId="d0abce2a322c43a5" providerId="LiveId" clId="{ADFD2B2D-6693-472B-9AA3-4F1E67DE2D0B}" dt="2018-04-22T14:40:32.320" v="9" actId="2696"/>
-        <pc:sldMkLst>
-          <pc:docMk/>
-          <pc:sldMk cId="3167373508" sldId="279"/>
-        </pc:sldMkLst>
-      </pc:sldChg>
-      <pc:sldChg chg="del">
-        <pc:chgData name="Stephen Deck" userId="d0abce2a322c43a5" providerId="LiveId" clId="{ADFD2B2D-6693-472B-9AA3-4F1E67DE2D0B}" dt="2018-04-22T14:40:32.201" v="6" actId="2696"/>
-        <pc:sldMkLst>
-          <pc:docMk/>
-          <pc:sldMk cId="2174148818" sldId="280"/>
-        </pc:sldMkLst>
-      </pc:sldChg>
-      <pc:sldChg chg="del">
-        <pc:chgData name="Stephen Deck" userId="d0abce2a322c43a5" providerId="LiveId" clId="{ADFD2B2D-6693-472B-9AA3-4F1E67DE2D0B}" dt="2018-04-22T14:40:32.403" v="11" actId="2696"/>
-        <pc:sldMkLst>
-          <pc:docMk/>
-          <pc:sldMk cId="2767271775" sldId="281"/>
-        </pc:sldMkLst>
-      </pc:sldChg>
-      <pc:sldChg chg="del">
-        <pc:chgData name="Stephen Deck" userId="d0abce2a322c43a5" providerId="LiveId" clId="{ADFD2B2D-6693-472B-9AA3-4F1E67DE2D0B}" dt="2018-04-22T14:40:32.361" v="10" actId="2696"/>
-        <pc:sldMkLst>
-          <pc:docMk/>
-          <pc:sldMk cId="1444145971" sldId="282"/>
-        </pc:sldMkLst>
-      </pc:sldChg>
-      <pc:sldChg chg="del">
-        <pc:chgData name="Stephen Deck" userId="d0abce2a322c43a5" providerId="LiveId" clId="{ADFD2B2D-6693-472B-9AA3-4F1E67DE2D0B}" dt="2018-04-22T14:40:32.260" v="8" actId="2696"/>
-        <pc:sldMkLst>
-          <pc:docMk/>
-          <pc:sldMk cId="2569779248" sldId="283"/>
-        </pc:sldMkLst>
-      </pc:sldChg>
-      <pc:sldChg chg="del">
-        <pc:chgData name="Stephen Deck" userId="d0abce2a322c43a5" providerId="LiveId" clId="{ADFD2B2D-6693-472B-9AA3-4F1E67DE2D0B}" dt="2018-04-22T14:40:32.448" v="12" actId="2696"/>
-        <pc:sldMkLst>
-          <pc:docMk/>
-          <pc:sldMk cId="211525463" sldId="284"/>
-        </pc:sldMkLst>
-      </pc:sldChg>
-      <pc:sldChg chg="del">
-        <pc:chgData name="Stephen Deck" userId="d0abce2a322c43a5" providerId="LiveId" clId="{ADFD2B2D-6693-472B-9AA3-4F1E67DE2D0B}" dt="2018-04-22T14:40:32.479" v="13" actId="2696"/>
-        <pc:sldMkLst>
-          <pc:docMk/>
-          <pc:sldMk cId="2824500291" sldId="285"/>
-        </pc:sldMkLst>
-      </pc:sldChg>
-      <pc:sldChg chg="del">
-        <pc:chgData name="Stephen Deck" userId="d0abce2a322c43a5" providerId="LiveId" clId="{ADFD2B2D-6693-472B-9AA3-4F1E67DE2D0B}" dt="2018-04-22T14:40:32.565" v="14" actId="2696"/>
-        <pc:sldMkLst>
-          <pc:docMk/>
-          <pc:sldMk cId="3681746238" sldId="286"/>
-        </pc:sldMkLst>
-      </pc:sldChg>
-      <pc:sldChg chg="del">
-        <pc:chgData name="Stephen Deck" userId="d0abce2a322c43a5" providerId="LiveId" clId="{ADFD2B2D-6693-472B-9AA3-4F1E67DE2D0B}" dt="2018-04-22T14:40:32.688" v="18" actId="2696"/>
-        <pc:sldMkLst>
-          <pc:docMk/>
-          <pc:sldMk cId="3779883294" sldId="287"/>
-        </pc:sldMkLst>
-      </pc:sldChg>
-      <pc:sldChg chg="del">
-        <pc:chgData name="Stephen Deck" userId="d0abce2a322c43a5" providerId="LiveId" clId="{ADFD2B2D-6693-472B-9AA3-4F1E67DE2D0B}" dt="2018-04-22T14:40:32.625" v="16" actId="2696"/>
-        <pc:sldMkLst>
-          <pc:docMk/>
-          <pc:sldMk cId="1993731998" sldId="288"/>
-        </pc:sldMkLst>
-      </pc:sldChg>
-      <pc:sldChg chg="del">
-        <pc:chgData name="Stephen Deck" userId="d0abce2a322c43a5" providerId="LiveId" clId="{ADFD2B2D-6693-472B-9AA3-4F1E67DE2D0B}" dt="2018-04-22T14:40:32.593" v="15" actId="2696"/>
-        <pc:sldMkLst>
-          <pc:docMk/>
-          <pc:sldMk cId="1790178369" sldId="289"/>
-        </pc:sldMkLst>
-      </pc:sldChg>
-      <pc:sldChg chg="del">
-        <pc:chgData name="Stephen Deck" userId="d0abce2a322c43a5" providerId="LiveId" clId="{ADFD2B2D-6693-472B-9AA3-4F1E67DE2D0B}" dt="2018-04-22T14:40:32.656" v="17" actId="2696"/>
-        <pc:sldMkLst>
-          <pc:docMk/>
-          <pc:sldMk cId="3479895894" sldId="290"/>
-        </pc:sldMkLst>
-      </pc:sldChg>
-      <pc:sldChg chg="del">
-        <pc:chgData name="Stephen Deck" userId="d0abce2a322c43a5" providerId="LiveId" clId="{ADFD2B2D-6693-472B-9AA3-4F1E67DE2D0B}" dt="2018-04-22T14:40:36.466" v="19" actId="2696"/>
-        <pc:sldMkLst>
-          <pc:docMk/>
-          <pc:sldMk cId="2833572157" sldId="291"/>
-        </pc:sldMkLst>
-      </pc:sldChg>
-      <pc:sldChg chg="del">
-        <pc:chgData name="Stephen Deck" userId="d0abce2a322c43a5" providerId="LiveId" clId="{ADFD2B2D-6693-472B-9AA3-4F1E67DE2D0B}" dt="2018-04-22T14:41:07.094" v="20" actId="2696"/>
-        <pc:sldMkLst>
-          <pc:docMk/>
-          <pc:sldMk cId="1817222083" sldId="293"/>
-        </pc:sldMkLst>
-      </pc:sldChg>
-      <pc:sldChg chg="del">
-        <pc:chgData name="Stephen Deck" userId="d0abce2a322c43a5" providerId="LiveId" clId="{ADFD2B2D-6693-472B-9AA3-4F1E67DE2D0B}" dt="2018-04-22T14:41:07.154" v="23" actId="2696"/>
-        <pc:sldMkLst>
-          <pc:docMk/>
-          <pc:sldMk cId="782208815" sldId="294"/>
-        </pc:sldMkLst>
-      </pc:sldChg>
-      <pc:sldChg chg="del">
-        <pc:chgData name="Stephen Deck" userId="d0abce2a322c43a5" providerId="LiveId" clId="{ADFD2B2D-6693-472B-9AA3-4F1E67DE2D0B}" dt="2018-04-22T14:41:07.375" v="31" actId="2696"/>
-        <pc:sldMkLst>
-          <pc:docMk/>
-          <pc:sldMk cId="2980388268" sldId="295"/>
-        </pc:sldMkLst>
-      </pc:sldChg>
-      <pc:sldChg chg="del">
-        <pc:chgData name="Stephen Deck" userId="d0abce2a322c43a5" providerId="LiveId" clId="{ADFD2B2D-6693-472B-9AA3-4F1E67DE2D0B}" dt="2018-04-22T14:41:07.115" v="21" actId="2696"/>
-        <pc:sldMkLst>
-          <pc:docMk/>
-          <pc:sldMk cId="1598195668" sldId="296"/>
-        </pc:sldMkLst>
-      </pc:sldChg>
-      <pc:sldChg chg="del">
-        <pc:chgData name="Stephen Deck" userId="d0abce2a322c43a5" providerId="LiveId" clId="{ADFD2B2D-6693-472B-9AA3-4F1E67DE2D0B}" dt="2018-04-22T14:41:07.134" v="22" actId="2696"/>
-        <pc:sldMkLst>
-          <pc:docMk/>
-          <pc:sldMk cId="33891465" sldId="297"/>
-        </pc:sldMkLst>
-      </pc:sldChg>
-      <pc:sldChg chg="del">
-        <pc:chgData name="Stephen Deck" userId="d0abce2a322c43a5" providerId="LiveId" clId="{ADFD2B2D-6693-472B-9AA3-4F1E67DE2D0B}" dt="2018-04-22T14:41:07.401" v="32" actId="2696"/>
-        <pc:sldMkLst>
-          <pc:docMk/>
-          <pc:sldMk cId="2403198923" sldId="298"/>
-        </pc:sldMkLst>
-      </pc:sldChg>
-      <pc:sldChg chg="del">
-        <pc:chgData name="Stephen Deck" userId="d0abce2a322c43a5" providerId="LiveId" clId="{ADFD2B2D-6693-472B-9AA3-4F1E67DE2D0B}" dt="2018-04-22T14:41:07.661" v="41" actId="2696"/>
-        <pc:sldMkLst>
-          <pc:docMk/>
-          <pc:sldMk cId="4003284301" sldId="299"/>
-        </pc:sldMkLst>
-      </pc:sldChg>
-      <pc:sldChg chg="del">
-        <pc:chgData name="Stephen Deck" userId="d0abce2a322c43a5" providerId="LiveId" clId="{ADFD2B2D-6693-472B-9AA3-4F1E67DE2D0B}" dt="2018-04-22T14:41:07.716" v="43" actId="2696"/>
-        <pc:sldMkLst>
-          <pc:docMk/>
-          <pc:sldMk cId="1957513323" sldId="300"/>
-        </pc:sldMkLst>
-      </pc:sldChg>
-      <pc:sldChg chg="del">
-        <pc:chgData name="Stephen Deck" userId="d0abce2a322c43a5" providerId="LiveId" clId="{ADFD2B2D-6693-472B-9AA3-4F1E67DE2D0B}" dt="2018-04-22T14:41:07.860" v="48" actId="2696"/>
-        <pc:sldMkLst>
-          <pc:docMk/>
-          <pc:sldMk cId="1226059620" sldId="301"/>
-        </pc:sldMkLst>
-      </pc:sldChg>
-      <pc:sldChg chg="del">
-        <pc:chgData name="Stephen Deck" userId="d0abce2a322c43a5" providerId="LiveId" clId="{ADFD2B2D-6693-472B-9AA3-4F1E67DE2D0B}" dt="2018-04-22T14:40:32.225" v="7" actId="2696"/>
-        <pc:sldMkLst>
-          <pc:docMk/>
-          <pc:sldMk cId="1265854071" sldId="303"/>
-        </pc:sldMkLst>
-      </pc:sldChg>
-      <pc:sldChg chg="del">
-        <pc:chgData name="Stephen Deck" userId="d0abce2a322c43a5" providerId="LiveId" clId="{ADFD2B2D-6693-472B-9AA3-4F1E67DE2D0B}" dt="2018-04-22T14:40:31.983" v="4" actId="2696"/>
-        <pc:sldMkLst>
-          <pc:docMk/>
-          <pc:sldMk cId="3291766465" sldId="304"/>
-        </pc:sldMkLst>
-      </pc:sldChg>
-      <pc:sldChg chg="del">
-        <pc:chgData name="Stephen Deck" userId="d0abce2a322c43a5" providerId="LiveId" clId="{ADFD2B2D-6693-472B-9AA3-4F1E67DE2D0B}" dt="2018-04-22T14:41:07.428" v="33" actId="2696"/>
-        <pc:sldMkLst>
-          <pc:docMk/>
-          <pc:sldMk cId="4084573708" sldId="305"/>
-        </pc:sldMkLst>
-      </pc:sldChg>
-      <pc:sldChg chg="del">
-        <pc:chgData name="Stephen Deck" userId="d0abce2a322c43a5" providerId="LiveId" clId="{ADFD2B2D-6693-472B-9AA3-4F1E67DE2D0B}" dt="2018-04-22T14:41:07.692" v="42" actId="2696"/>
-        <pc:sldMkLst>
-          <pc:docMk/>
-          <pc:sldMk cId="3939612792" sldId="306"/>
-        </pc:sldMkLst>
-      </pc:sldChg>
-      <pc:sldChg chg="del">
-        <pc:chgData name="Stephen Deck" userId="d0abce2a322c43a5" providerId="LiveId" clId="{ADFD2B2D-6693-472B-9AA3-4F1E67DE2D0B}" dt="2018-04-22T14:41:07.453" v="34" actId="2696"/>
-        <pc:sldMkLst>
-          <pc:docMk/>
-          <pc:sldMk cId="1340069480" sldId="307"/>
-        </pc:sldMkLst>
-      </pc:sldChg>
-      <pc:sldChg chg="del">
-        <pc:chgData name="Stephen Deck" userId="d0abce2a322c43a5" providerId="LiveId" clId="{ADFD2B2D-6693-472B-9AA3-4F1E67DE2D0B}" dt="2018-04-22T14:41:07.477" v="35" actId="2696"/>
-        <pc:sldMkLst>
-          <pc:docMk/>
-          <pc:sldMk cId="3214217323" sldId="308"/>
-        </pc:sldMkLst>
-      </pc:sldChg>
-      <pc:sldChg chg="del">
-        <pc:chgData name="Stephen Deck" userId="d0abce2a322c43a5" providerId="LiveId" clId="{ADFD2B2D-6693-472B-9AA3-4F1E67DE2D0B}" dt="2018-04-22T14:41:07.743" v="44" actId="2696"/>
-        <pc:sldMkLst>
-          <pc:docMk/>
-          <pc:sldMk cId="175692187" sldId="309"/>
-        </pc:sldMkLst>
-      </pc:sldChg>
-      <pc:sldChg chg="del">
-        <pc:chgData name="Stephen Deck" userId="d0abce2a322c43a5" providerId="LiveId" clId="{ADFD2B2D-6693-472B-9AA3-4F1E67DE2D0B}" dt="2018-04-22T14:41:07.778" v="45" actId="2696"/>
-        <pc:sldMkLst>
-          <pc:docMk/>
-          <pc:sldMk cId="192854978" sldId="310"/>
-        </pc:sldMkLst>
-      </pc:sldChg>
-      <pc:sldChg chg="del">
-        <pc:chgData name="Stephen Deck" userId="d0abce2a322c43a5" providerId="LiveId" clId="{ADFD2B2D-6693-472B-9AA3-4F1E67DE2D0B}" dt="2018-04-22T14:41:25.994" v="62" actId="2696"/>
-        <pc:sldMkLst>
-          <pc:docMk/>
-          <pc:sldMk cId="3106833495" sldId="311"/>
-        </pc:sldMkLst>
-      </pc:sldChg>
-      <pc:sldChg chg="del">
-        <pc:chgData name="Stephen Deck" userId="d0abce2a322c43a5" providerId="LiveId" clId="{ADFD2B2D-6693-472B-9AA3-4F1E67DE2D0B}" dt="2018-04-22T14:41:26.025" v="64" actId="2696"/>
-        <pc:sldMkLst>
-          <pc:docMk/>
-          <pc:sldMk cId="471882139" sldId="312"/>
-        </pc:sldMkLst>
-      </pc:sldChg>
-      <pc:sldChg chg="del">
-        <pc:chgData name="Stephen Deck" userId="d0abce2a322c43a5" providerId="LiveId" clId="{ADFD2B2D-6693-472B-9AA3-4F1E67DE2D0B}" dt="2018-04-22T14:41:26.009" v="63" actId="2696"/>
-        <pc:sldMkLst>
-          <pc:docMk/>
-          <pc:sldMk cId="4018591003" sldId="313"/>
-        </pc:sldMkLst>
-      </pc:sldChg>
-      <pc:sldChg chg="del">
-        <pc:chgData name="Stephen Deck" userId="d0abce2a322c43a5" providerId="LiveId" clId="{ADFD2B2D-6693-472B-9AA3-4F1E67DE2D0B}" dt="2018-04-22T14:41:26.052" v="65" actId="2696"/>
-        <pc:sldMkLst>
-          <pc:docMk/>
-          <pc:sldMk cId="833029415" sldId="314"/>
-        </pc:sldMkLst>
-      </pc:sldChg>
-      <pc:sldChg chg="del">
-        <pc:chgData name="Stephen Deck" userId="d0abce2a322c43a5" providerId="LiveId" clId="{ADFD2B2D-6693-472B-9AA3-4F1E67DE2D0B}" dt="2018-04-22T14:41:26.095" v="66" actId="2696"/>
-        <pc:sldMkLst>
-          <pc:docMk/>
-          <pc:sldMk cId="1889074522" sldId="315"/>
-        </pc:sldMkLst>
-      </pc:sldChg>
-      <pc:sldChg chg="del">
-        <pc:chgData name="Stephen Deck" userId="d0abce2a322c43a5" providerId="LiveId" clId="{ADFD2B2D-6693-472B-9AA3-4F1E67DE2D0B}" dt="2018-04-22T14:41:26.128" v="67" actId="2696"/>
-        <pc:sldMkLst>
-          <pc:docMk/>
-          <pc:sldMk cId="3804453732" sldId="316"/>
-        </pc:sldMkLst>
-      </pc:sldChg>
-      <pc:sldChg chg="del">
-        <pc:chgData name="Stephen Deck" userId="d0abce2a322c43a5" providerId="LiveId" clId="{ADFD2B2D-6693-472B-9AA3-4F1E67DE2D0B}" dt="2018-04-22T14:41:26.156" v="68" actId="2696"/>
-        <pc:sldMkLst>
-          <pc:docMk/>
-          <pc:sldMk cId="3449299165" sldId="317"/>
-        </pc:sldMkLst>
-      </pc:sldChg>
-      <pc:sldChg chg="del">
-        <pc:chgData name="Stephen Deck" userId="d0abce2a322c43a5" providerId="LiveId" clId="{ADFD2B2D-6693-472B-9AA3-4F1E67DE2D0B}" dt="2018-04-22T14:41:26.216" v="70" actId="2696"/>
-        <pc:sldMkLst>
-          <pc:docMk/>
-          <pc:sldMk cId="3525014666" sldId="318"/>
-        </pc:sldMkLst>
-      </pc:sldChg>
-      <pc:sldChg chg="del">
-        <pc:chgData name="Stephen Deck" userId="d0abce2a322c43a5" providerId="LiveId" clId="{ADFD2B2D-6693-472B-9AA3-4F1E67DE2D0B}" dt="2018-04-22T14:41:26.243" v="71" actId="2696"/>
-        <pc:sldMkLst>
-          <pc:docMk/>
-          <pc:sldMk cId="626672928" sldId="319"/>
-        </pc:sldMkLst>
-      </pc:sldChg>
-      <pc:sldChg chg="del">
-        <pc:chgData name="Stephen Deck" userId="d0abce2a322c43a5" providerId="LiveId" clId="{ADFD2B2D-6693-472B-9AA3-4F1E67DE2D0B}" dt="2018-04-22T14:41:26.266" v="72" actId="2696"/>
-        <pc:sldMkLst>
-          <pc:docMk/>
-          <pc:sldMk cId="562224854" sldId="320"/>
-        </pc:sldMkLst>
-      </pc:sldChg>
-      <pc:sldChg chg="del">
-        <pc:chgData name="Stephen Deck" userId="d0abce2a322c43a5" providerId="LiveId" clId="{ADFD2B2D-6693-472B-9AA3-4F1E67DE2D0B}" dt="2018-04-22T14:41:26.189" v="69" actId="2696"/>
-        <pc:sldMkLst>
-          <pc:docMk/>
-          <pc:sldMk cId="3636449866" sldId="321"/>
-        </pc:sldMkLst>
-      </pc:sldChg>
-      <pc:sldChg chg="del">
-        <pc:chgData name="Stephen Deck" userId="d0abce2a322c43a5" providerId="LiveId" clId="{ADFD2B2D-6693-472B-9AA3-4F1E67DE2D0B}" dt="2018-04-22T14:41:26.296" v="73" actId="2696"/>
-        <pc:sldMkLst>
-          <pc:docMk/>
-          <pc:sldMk cId="1998398562" sldId="322"/>
-        </pc:sldMkLst>
-      </pc:sldChg>
-      <pc:sldChg chg="del">
-        <pc:chgData name="Stephen Deck" userId="d0abce2a322c43a5" providerId="LiveId" clId="{ADFD2B2D-6693-472B-9AA3-4F1E67DE2D0B}" dt="2018-04-22T14:41:26.336" v="74" actId="2696"/>
-        <pc:sldMkLst>
-          <pc:docMk/>
-          <pc:sldMk cId="810221071" sldId="323"/>
-        </pc:sldMkLst>
-      </pc:sldChg>
-      <pc:sldChg chg="del">
-        <pc:chgData name="Stephen Deck" userId="d0abce2a322c43a5" providerId="LiveId" clId="{ADFD2B2D-6693-472B-9AA3-4F1E67DE2D0B}" dt="2018-04-22T14:42:04.451" v="77" actId="2696"/>
-        <pc:sldMkLst>
-          <pc:docMk/>
-          <pc:sldMk cId="2930923852" sldId="325"/>
-        </pc:sldMkLst>
-      </pc:sldChg>
-      <pc:sldChg chg="del">
-        <pc:chgData name="Stephen Deck" userId="d0abce2a322c43a5" providerId="LiveId" clId="{ADFD2B2D-6693-472B-9AA3-4F1E67DE2D0B}" dt="2018-04-22T14:42:04.464" v="78" actId="2696"/>
-        <pc:sldMkLst>
-          <pc:docMk/>
-          <pc:sldMk cId="1806039039" sldId="326"/>
-        </pc:sldMkLst>
-      </pc:sldChg>
-      <pc:sldChg chg="del">
-        <pc:chgData name="Stephen Deck" userId="d0abce2a322c43a5" providerId="LiveId" clId="{ADFD2B2D-6693-472B-9AA3-4F1E67DE2D0B}" dt="2018-04-22T14:42:04.477" v="79" actId="2696"/>
-        <pc:sldMkLst>
-          <pc:docMk/>
-          <pc:sldMk cId="3245239115" sldId="327"/>
-        </pc:sldMkLst>
-      </pc:sldChg>
-      <pc:sldChg chg="del">
-        <pc:chgData name="Stephen Deck" userId="d0abce2a322c43a5" providerId="LiveId" clId="{ADFD2B2D-6693-472B-9AA3-4F1E67DE2D0B}" dt="2018-04-22T14:42:04.496" v="80" actId="2696"/>
-        <pc:sldMkLst>
-          <pc:docMk/>
-          <pc:sldMk cId="3846621009" sldId="328"/>
-        </pc:sldMkLst>
-      </pc:sldChg>
-      <pc:sldChg chg="del">
-        <pc:chgData name="Stephen Deck" userId="d0abce2a322c43a5" providerId="LiveId" clId="{ADFD2B2D-6693-472B-9AA3-4F1E67DE2D0B}" dt="2018-04-22T14:42:04.536" v="82" actId="2696"/>
-        <pc:sldMkLst>
-          <pc:docMk/>
-          <pc:sldMk cId="916098536" sldId="329"/>
-        </pc:sldMkLst>
-      </pc:sldChg>
-      <pc:sldChg chg="del">
-        <pc:chgData name="Stephen Deck" userId="d0abce2a322c43a5" providerId="LiveId" clId="{ADFD2B2D-6693-472B-9AA3-4F1E67DE2D0B}" dt="2018-04-22T14:42:04.514" v="81" actId="2696"/>
-        <pc:sldMkLst>
-          <pc:docMk/>
-          <pc:sldMk cId="256762286" sldId="331"/>
-        </pc:sldMkLst>
-      </pc:sldChg>
-      <pc:sldChg chg="del">
-        <pc:chgData name="Stephen Deck" userId="d0abce2a322c43a5" providerId="LiveId" clId="{ADFD2B2D-6693-472B-9AA3-4F1E67DE2D0B}" dt="2018-04-22T14:42:04.549" v="83" actId="2696"/>
-        <pc:sldMkLst>
-          <pc:docMk/>
-          <pc:sldMk cId="1541459879" sldId="332"/>
-        </pc:sldMkLst>
-      </pc:sldChg>
-      <pc:sldChg chg="del">
-        <pc:chgData name="Stephen Deck" userId="d0abce2a322c43a5" providerId="LiveId" clId="{ADFD2B2D-6693-472B-9AA3-4F1E67DE2D0B}" dt="2018-04-22T14:42:04.568" v="84" actId="2696"/>
-        <pc:sldMkLst>
-          <pc:docMk/>
-          <pc:sldMk cId="1541239710" sldId="333"/>
-        </pc:sldMkLst>
-      </pc:sldChg>
-      <pc:sldChg chg="del">
-        <pc:chgData name="Stephen Deck" userId="d0abce2a322c43a5" providerId="LiveId" clId="{ADFD2B2D-6693-472B-9AA3-4F1E67DE2D0B}" dt="2018-04-22T14:42:04.597" v="85" actId="2696"/>
-        <pc:sldMkLst>
-          <pc:docMk/>
-          <pc:sldMk cId="323435294" sldId="334"/>
-        </pc:sldMkLst>
-      </pc:sldChg>
-      <pc:sldChg chg="del">
-        <pc:chgData name="Stephen Deck" userId="d0abce2a322c43a5" providerId="LiveId" clId="{ADFD2B2D-6693-472B-9AA3-4F1E67DE2D0B}" dt="2018-04-22T14:42:04.628" v="86" actId="2696"/>
-        <pc:sldMkLst>
-          <pc:docMk/>
-          <pc:sldMk cId="2348179689" sldId="335"/>
-        </pc:sldMkLst>
-      </pc:sldChg>
-      <pc:sldChg chg="del">
-        <pc:chgData name="Stephen Deck" userId="d0abce2a322c43a5" providerId="LiveId" clId="{ADFD2B2D-6693-472B-9AA3-4F1E67DE2D0B}" dt="2018-04-22T14:42:04.662" v="87" actId="2696"/>
-        <pc:sldMkLst>
-          <pc:docMk/>
-          <pc:sldMk cId="2414683238" sldId="336"/>
-        </pc:sldMkLst>
-      </pc:sldChg>
-      <pc:sldChg chg="del">
-        <pc:chgData name="Stephen Deck" userId="d0abce2a322c43a5" providerId="LiveId" clId="{ADFD2B2D-6693-472B-9AA3-4F1E67DE2D0B}" dt="2018-04-22T14:42:04.685" v="88" actId="2696"/>
-        <pc:sldMkLst>
-          <pc:docMk/>
-          <pc:sldMk cId="3909953668" sldId="337"/>
-        </pc:sldMkLst>
-      </pc:sldChg>
-      <pc:sldChg chg="del">
-        <pc:chgData name="Stephen Deck" userId="d0abce2a322c43a5" providerId="LiveId" clId="{ADFD2B2D-6693-472B-9AA3-4F1E67DE2D0B}" dt="2018-04-22T14:42:04.713" v="89" actId="2696"/>
-        <pc:sldMkLst>
-          <pc:docMk/>
-          <pc:sldMk cId="3891655222" sldId="338"/>
-        </pc:sldMkLst>
-      </pc:sldChg>
-      <pc:sldChg chg="del">
-        <pc:chgData name="Stephen Deck" userId="d0abce2a322c43a5" providerId="LiveId" clId="{ADFD2B2D-6693-472B-9AA3-4F1E67DE2D0B}" dt="2018-04-22T14:42:04.739" v="90" actId="2696"/>
-        <pc:sldMkLst>
-          <pc:docMk/>
-          <pc:sldMk cId="1265585465" sldId="339"/>
-        </pc:sldMkLst>
-      </pc:sldChg>
-      <pc:sldChg chg="del">
-        <pc:chgData name="Stephen Deck" userId="d0abce2a322c43a5" providerId="LiveId" clId="{ADFD2B2D-6693-472B-9AA3-4F1E67DE2D0B}" dt="2018-04-22T14:42:04.763" v="91" actId="2696"/>
-        <pc:sldMkLst>
-          <pc:docMk/>
-          <pc:sldMk cId="1339859580" sldId="340"/>
-        </pc:sldMkLst>
-      </pc:sldChg>
-      <pc:sldChg chg="del">
-        <pc:chgData name="Stephen Deck" userId="d0abce2a322c43a5" providerId="LiveId" clId="{ADFD2B2D-6693-472B-9AA3-4F1E67DE2D0B}" dt="2018-04-22T14:42:04.782" v="92" actId="2696"/>
-        <pc:sldMkLst>
-          <pc:docMk/>
-          <pc:sldMk cId="85330703" sldId="341"/>
-        </pc:sldMkLst>
-      </pc:sldChg>
-      <pc:sldChg chg="del">
-        <pc:chgData name="Stephen Deck" userId="d0abce2a322c43a5" providerId="LiveId" clId="{ADFD2B2D-6693-472B-9AA3-4F1E67DE2D0B}" dt="2018-04-22T14:42:04.817" v="93" actId="2696"/>
-        <pc:sldMkLst>
-          <pc:docMk/>
-          <pc:sldMk cId="2012231230" sldId="342"/>
-        </pc:sldMkLst>
-      </pc:sldChg>
-      <pc:sldChg chg="del">
-        <pc:chgData name="Stephen Deck" userId="d0abce2a322c43a5" providerId="LiveId" clId="{ADFD2B2D-6693-472B-9AA3-4F1E67DE2D0B}" dt="2018-04-22T14:42:04.864" v="95" actId="2696"/>
-        <pc:sldMkLst>
-          <pc:docMk/>
-          <pc:sldMk cId="3865876980" sldId="343"/>
-        </pc:sldMkLst>
-      </pc:sldChg>
-      <pc:sldChg chg="del">
-        <pc:chgData name="Stephen Deck" userId="d0abce2a322c43a5" providerId="LiveId" clId="{ADFD2B2D-6693-472B-9AA3-4F1E67DE2D0B}" dt="2018-04-22T14:42:04.885" v="96" actId="2696"/>
-        <pc:sldMkLst>
-          <pc:docMk/>
-          <pc:sldMk cId="2207310097" sldId="344"/>
-        </pc:sldMkLst>
-      </pc:sldChg>
-      <pc:sldChg chg="del">
-        <pc:chgData name="Stephen Deck" userId="d0abce2a322c43a5" providerId="LiveId" clId="{ADFD2B2D-6693-472B-9AA3-4F1E67DE2D0B}" dt="2018-04-22T14:42:04.915" v="97" actId="2696"/>
-        <pc:sldMkLst>
-          <pc:docMk/>
-          <pc:sldMk cId="1312908871" sldId="345"/>
-        </pc:sldMkLst>
-      </pc:sldChg>
-      <pc:sldChg chg="del">
-        <pc:chgData name="Stephen Deck" userId="d0abce2a322c43a5" providerId="LiveId" clId="{ADFD2B2D-6693-472B-9AA3-4F1E67DE2D0B}" dt="2018-04-22T14:42:04.945" v="98" actId="2696"/>
-        <pc:sldMkLst>
-          <pc:docMk/>
-          <pc:sldMk cId="2204550597" sldId="346"/>
-        </pc:sldMkLst>
-      </pc:sldChg>
-      <pc:sldChg chg="del">
-        <pc:chgData name="Stephen Deck" userId="d0abce2a322c43a5" providerId="LiveId" clId="{ADFD2B2D-6693-472B-9AA3-4F1E67DE2D0B}" dt="2018-04-22T14:42:04.965" v="99" actId="2696"/>
-        <pc:sldMkLst>
-          <pc:docMk/>
-          <pc:sldMk cId="3534747201" sldId="347"/>
-        </pc:sldMkLst>
-      </pc:sldChg>
-      <pc:sldChg chg="del">
-        <pc:chgData name="Stephen Deck" userId="d0abce2a322c43a5" providerId="LiveId" clId="{ADFD2B2D-6693-472B-9AA3-4F1E67DE2D0B}" dt="2018-04-22T14:42:05.014" v="101" actId="2696"/>
-        <pc:sldMkLst>
-          <pc:docMk/>
-          <pc:sldMk cId="341658327" sldId="348"/>
-        </pc:sldMkLst>
-      </pc:sldChg>
-      <pc:sldChg chg="del">
-        <pc:chgData name="Stephen Deck" userId="d0abce2a322c43a5" providerId="LiveId" clId="{ADFD2B2D-6693-472B-9AA3-4F1E67DE2D0B}" dt="2018-04-22T14:42:04.996" v="100" actId="2696"/>
-        <pc:sldMkLst>
-          <pc:docMk/>
-          <pc:sldMk cId="3948927571" sldId="349"/>
-        </pc:sldMkLst>
-      </pc:sldChg>
-      <pc:sldChg chg="del">
-        <pc:chgData name="Stephen Deck" userId="d0abce2a322c43a5" providerId="LiveId" clId="{ADFD2B2D-6693-472B-9AA3-4F1E67DE2D0B}" dt="2018-04-22T14:42:05.040" v="102" actId="2696"/>
-        <pc:sldMkLst>
-          <pc:docMk/>
-          <pc:sldMk cId="2130247399" sldId="350"/>
-        </pc:sldMkLst>
-      </pc:sldChg>
-      <pc:sldChg chg="del">
-        <pc:chgData name="Stephen Deck" userId="d0abce2a322c43a5" providerId="LiveId" clId="{ADFD2B2D-6693-472B-9AA3-4F1E67DE2D0B}" dt="2018-04-22T14:42:05.064" v="103" actId="2696"/>
-        <pc:sldMkLst>
-          <pc:docMk/>
-          <pc:sldMk cId="2815884632" sldId="351"/>
-        </pc:sldMkLst>
-      </pc:sldChg>
-      <pc:sldChg chg="del">
-        <pc:chgData name="Stephen Deck" userId="d0abce2a322c43a5" providerId="LiveId" clId="{ADFD2B2D-6693-472B-9AA3-4F1E67DE2D0B}" dt="2018-04-22T14:42:05.089" v="104" actId="2696"/>
-        <pc:sldMkLst>
-          <pc:docMk/>
-          <pc:sldMk cId="645903311" sldId="352"/>
-        </pc:sldMkLst>
-      </pc:sldChg>
-      <pc:sldChg chg="del">
-        <pc:chgData name="Stephen Deck" userId="d0abce2a322c43a5" providerId="LiveId" clId="{ADFD2B2D-6693-472B-9AA3-4F1E67DE2D0B}" dt="2018-04-22T14:42:05.113" v="105" actId="2696"/>
-        <pc:sldMkLst>
-          <pc:docMk/>
-          <pc:sldMk cId="1351896557" sldId="353"/>
-        </pc:sldMkLst>
-      </pc:sldChg>
-      <pc:sldChg chg="del">
-        <pc:chgData name="Stephen Deck" userId="d0abce2a322c43a5" providerId="LiveId" clId="{ADFD2B2D-6693-472B-9AA3-4F1E67DE2D0B}" dt="2018-04-22T14:42:05.145" v="106" actId="2696"/>
-        <pc:sldMkLst>
-          <pc:docMk/>
-          <pc:sldMk cId="1939761547" sldId="354"/>
-        </pc:sldMkLst>
-      </pc:sldChg>
-      <pc:sldChg chg="del">
-        <pc:chgData name="Stephen Deck" userId="d0abce2a322c43a5" providerId="LiveId" clId="{ADFD2B2D-6693-472B-9AA3-4F1E67DE2D0B}" dt="2018-04-22T14:42:05.181" v="107" actId="2696"/>
-        <pc:sldMkLst>
-          <pc:docMk/>
-          <pc:sldMk cId="2539611937" sldId="355"/>
-        </pc:sldMkLst>
-      </pc:sldChg>
-      <pc:sldChg chg="del">
-        <pc:chgData name="Stephen Deck" userId="d0abce2a322c43a5" providerId="LiveId" clId="{ADFD2B2D-6693-472B-9AA3-4F1E67DE2D0B}" dt="2018-04-22T14:42:05.211" v="108" actId="2696"/>
-        <pc:sldMkLst>
-          <pc:docMk/>
-          <pc:sldMk cId="3237988328" sldId="356"/>
-        </pc:sldMkLst>
-      </pc:sldChg>
-      <pc:sldChg chg="del">
-        <pc:chgData name="Stephen Deck" userId="d0abce2a322c43a5" providerId="LiveId" clId="{ADFD2B2D-6693-472B-9AA3-4F1E67DE2D0B}" dt="2018-04-22T14:42:05.237" v="109" actId="2696"/>
-        <pc:sldMkLst>
-          <pc:docMk/>
-          <pc:sldMk cId="775615554" sldId="357"/>
-        </pc:sldMkLst>
-      </pc:sldChg>
-      <pc:sldChg chg="del">
-        <pc:chgData name="Stephen Deck" userId="d0abce2a322c43a5" providerId="LiveId" clId="{ADFD2B2D-6693-472B-9AA3-4F1E67DE2D0B}" dt="2018-04-22T14:42:05.332" v="112" actId="2696"/>
-        <pc:sldMkLst>
-          <pc:docMk/>
-          <pc:sldMk cId="1474166215" sldId="358"/>
-        </pc:sldMkLst>
-      </pc:sldChg>
-      <pc:sldChg chg="del">
-        <pc:chgData name="Stephen Deck" userId="d0abce2a322c43a5" providerId="LiveId" clId="{ADFD2B2D-6693-472B-9AA3-4F1E67DE2D0B}" dt="2018-04-22T14:42:45.937" v="116" actId="2696"/>
-        <pc:sldMkLst>
-          <pc:docMk/>
-          <pc:sldMk cId="1433789035" sldId="359"/>
-        </pc:sldMkLst>
-      </pc:sldChg>
-      <pc:sldChg chg="del">
-        <pc:chgData name="Stephen Deck" userId="d0abce2a322c43a5" providerId="LiveId" clId="{ADFD2B2D-6693-472B-9AA3-4F1E67DE2D0B}" dt="2018-04-22T14:42:45.955" v="117" actId="2696"/>
-        <pc:sldMkLst>
-          <pc:docMk/>
-          <pc:sldMk cId="21829071" sldId="360"/>
-        </pc:sldMkLst>
-      </pc:sldChg>
-      <pc:sldChg chg="del">
-        <pc:chgData name="Stephen Deck" userId="d0abce2a322c43a5" providerId="LiveId" clId="{ADFD2B2D-6693-472B-9AA3-4F1E67DE2D0B}" dt="2018-04-22T14:42:46.082" v="121" actId="2696"/>
-        <pc:sldMkLst>
-          <pc:docMk/>
-          <pc:sldMk cId="1914327718" sldId="361"/>
-        </pc:sldMkLst>
-      </pc:sldChg>
-      <pc:sldChg chg="del">
-        <pc:chgData name="Stephen Deck" userId="d0abce2a322c43a5" providerId="LiveId" clId="{ADFD2B2D-6693-472B-9AA3-4F1E67DE2D0B}" dt="2018-04-22T14:42:46.105" v="122" actId="2696"/>
-        <pc:sldMkLst>
-          <pc:docMk/>
-          <pc:sldMk cId="399534337" sldId="362"/>
-        </pc:sldMkLst>
-      </pc:sldChg>
-      <pc:sldChg chg="del">
-        <pc:chgData name="Stephen Deck" userId="d0abce2a322c43a5" providerId="LiveId" clId="{ADFD2B2D-6693-472B-9AA3-4F1E67DE2D0B}" dt="2018-04-22T14:42:46.132" v="123" actId="2696"/>
-        <pc:sldMkLst>
-          <pc:docMk/>
-          <pc:sldMk cId="2949869000" sldId="363"/>
-        </pc:sldMkLst>
-      </pc:sldChg>
-      <pc:sldChg chg="del">
-        <pc:chgData name="Stephen Deck" userId="d0abce2a322c43a5" providerId="LiveId" clId="{ADFD2B2D-6693-472B-9AA3-4F1E67DE2D0B}" dt="2018-04-22T14:42:46.153" v="124" actId="2696"/>
-        <pc:sldMkLst>
-          <pc:docMk/>
-          <pc:sldMk cId="2848570306" sldId="365"/>
-        </pc:sldMkLst>
-      </pc:sldChg>
-      <pc:sldChg chg="del">
-        <pc:chgData name="Stephen Deck" userId="d0abce2a322c43a5" providerId="LiveId" clId="{ADFD2B2D-6693-472B-9AA3-4F1E67DE2D0B}" dt="2018-04-22T14:42:46.173" v="125" actId="2696"/>
-        <pc:sldMkLst>
-          <pc:docMk/>
-          <pc:sldMk cId="421450490" sldId="366"/>
-        </pc:sldMkLst>
-      </pc:sldChg>
-      <pc:sldChg chg="del">
-        <pc:chgData name="Stephen Deck" userId="d0abce2a322c43a5" providerId="LiveId" clId="{ADFD2B2D-6693-472B-9AA3-4F1E67DE2D0B}" dt="2018-04-22T14:42:46.273" v="129" actId="2696"/>
-        <pc:sldMkLst>
-          <pc:docMk/>
-          <pc:sldMk cId="3564748429" sldId="367"/>
-        </pc:sldMkLst>
-      </pc:sldChg>
-      <pc:sldChg chg="del">
-        <pc:chgData name="Stephen Deck" userId="d0abce2a322c43a5" providerId="LiveId" clId="{ADFD2B2D-6693-472B-9AA3-4F1E67DE2D0B}" dt="2018-04-22T14:42:46.247" v="128" actId="2696"/>
-        <pc:sldMkLst>
-          <pc:docMk/>
-          <pc:sldMk cId="2802563986" sldId="368"/>
-        </pc:sldMkLst>
-      </pc:sldChg>
-      <pc:sldChg chg="del">
-        <pc:chgData name="Stephen Deck" userId="d0abce2a322c43a5" providerId="LiveId" clId="{ADFD2B2D-6693-472B-9AA3-4F1E67DE2D0B}" dt="2018-04-22T14:42:46.216" v="127" actId="2696"/>
-        <pc:sldMkLst>
-          <pc:docMk/>
-          <pc:sldMk cId="4024902832" sldId="369"/>
-        </pc:sldMkLst>
-      </pc:sldChg>
-      <pc:sldChg chg="del">
-        <pc:chgData name="Stephen Deck" userId="d0abce2a322c43a5" providerId="LiveId" clId="{ADFD2B2D-6693-472B-9AA3-4F1E67DE2D0B}" dt="2018-04-22T14:42:46.198" v="126" actId="2696"/>
-        <pc:sldMkLst>
-          <pc:docMk/>
-          <pc:sldMk cId="189293168" sldId="370"/>
-        </pc:sldMkLst>
-      </pc:sldChg>
-      <pc:sldChg chg="del">
-        <pc:chgData name="Stephen Deck" userId="d0abce2a322c43a5" providerId="LiveId" clId="{ADFD2B2D-6693-472B-9AA3-4F1E67DE2D0B}" dt="2018-04-22T14:42:46.054" v="120" actId="2696"/>
-        <pc:sldMkLst>
-          <pc:docMk/>
-          <pc:sldMk cId="3188304701" sldId="371"/>
-        </pc:sldMkLst>
-      </pc:sldChg>
-      <pc:sldChg chg="del">
-        <pc:chgData name="Stephen Deck" userId="d0abce2a322c43a5" providerId="LiveId" clId="{ADFD2B2D-6693-472B-9AA3-4F1E67DE2D0B}" dt="2018-04-22T14:42:46.328" v="131" actId="2696"/>
-        <pc:sldMkLst>
-          <pc:docMk/>
-          <pc:sldMk cId="2931724535" sldId="372"/>
-        </pc:sldMkLst>
-      </pc:sldChg>
-      <pc:sldChg chg="del">
-        <pc:chgData name="Stephen Deck" userId="d0abce2a322c43a5" providerId="LiveId" clId="{ADFD2B2D-6693-472B-9AA3-4F1E67DE2D0B}" dt="2018-04-22T14:42:46.349" v="132" actId="2696"/>
-        <pc:sldMkLst>
-          <pc:docMk/>
-          <pc:sldMk cId="1765812615" sldId="373"/>
-        </pc:sldMkLst>
-      </pc:sldChg>
-      <pc:sldChg chg="del">
-        <pc:chgData name="Stephen Deck" userId="d0abce2a322c43a5" providerId="LiveId" clId="{ADFD2B2D-6693-472B-9AA3-4F1E67DE2D0B}" dt="2018-04-22T14:42:46.374" v="133" actId="2696"/>
-        <pc:sldMkLst>
-          <pc:docMk/>
-          <pc:sldMk cId="1744680929" sldId="374"/>
-        </pc:sldMkLst>
-      </pc:sldChg>
-      <pc:sldChg chg="del">
-        <pc:chgData name="Stephen Deck" userId="d0abce2a322c43a5" providerId="LiveId" clId="{ADFD2B2D-6693-472B-9AA3-4F1E67DE2D0B}" dt="2018-04-22T14:42:46.400" v="134" actId="2696"/>
-        <pc:sldMkLst>
-          <pc:docMk/>
-          <pc:sldMk cId="1320427239" sldId="375"/>
-        </pc:sldMkLst>
-      </pc:sldChg>
-      <pc:sldChg chg="del">
-        <pc:chgData name="Stephen Deck" userId="d0abce2a322c43a5" providerId="LiveId" clId="{ADFD2B2D-6693-472B-9AA3-4F1E67DE2D0B}" dt="2018-04-22T14:42:46.417" v="135" actId="2696"/>
-        <pc:sldMkLst>
-          <pc:docMk/>
-          <pc:sldMk cId="62805852" sldId="376"/>
-        </pc:sldMkLst>
-      </pc:sldChg>
-      <pc:sldChg chg="del">
-        <pc:chgData name="Stephen Deck" userId="d0abce2a322c43a5" providerId="LiveId" clId="{ADFD2B2D-6693-472B-9AA3-4F1E67DE2D0B}" dt="2018-04-22T14:42:46.434" v="136" actId="2696"/>
-        <pc:sldMkLst>
-          <pc:docMk/>
-          <pc:sldMk cId="3426848012" sldId="377"/>
-        </pc:sldMkLst>
-      </pc:sldChg>
-      <pc:sldChg chg="del">
-        <pc:chgData name="Stephen Deck" userId="d0abce2a322c43a5" providerId="LiveId" clId="{ADFD2B2D-6693-472B-9AA3-4F1E67DE2D0B}" dt="2018-04-22T14:42:46.461" v="137" actId="2696"/>
-        <pc:sldMkLst>
-          <pc:docMk/>
-          <pc:sldMk cId="2528286959" sldId="378"/>
-        </pc:sldMkLst>
-      </pc:sldChg>
-      <pc:sldChg chg="del">
-        <pc:chgData name="Stephen Deck" userId="d0abce2a322c43a5" providerId="LiveId" clId="{ADFD2B2D-6693-472B-9AA3-4F1E67DE2D0B}" dt="2018-04-22T14:42:46.500" v="138" actId="2696"/>
-        <pc:sldMkLst>
-          <pc:docMk/>
-          <pc:sldMk cId="3883509570" sldId="379"/>
-        </pc:sldMkLst>
-      </pc:sldChg>
-      <pc:sldChg chg="del">
-        <pc:chgData name="Stephen Deck" userId="d0abce2a322c43a5" providerId="LiveId" clId="{ADFD2B2D-6693-472B-9AA3-4F1E67DE2D0B}" dt="2018-04-22T14:42:46.549" v="140" actId="2696"/>
-        <pc:sldMkLst>
-          <pc:docMk/>
-          <pc:sldMk cId="2682376677" sldId="380"/>
-        </pc:sldMkLst>
-      </pc:sldChg>
-      <pc:sldChg chg="del">
-        <pc:chgData name="Stephen Deck" userId="d0abce2a322c43a5" providerId="LiveId" clId="{ADFD2B2D-6693-472B-9AA3-4F1E67DE2D0B}" dt="2018-04-22T14:41:07.801" v="46" actId="2696"/>
-        <pc:sldMkLst>
-          <pc:docMk/>
-          <pc:sldMk cId="976370243" sldId="383"/>
-        </pc:sldMkLst>
-      </pc:sldChg>
-      <pc:sldChg chg="del">
-        <pc:chgData name="Stephen Deck" userId="d0abce2a322c43a5" providerId="LiveId" clId="{ADFD2B2D-6693-472B-9AA3-4F1E67DE2D0B}" dt="2018-04-22T14:41:07.829" v="47" actId="2696"/>
-        <pc:sldMkLst>
-          <pc:docMk/>
-          <pc:sldMk cId="2484096430" sldId="384"/>
-        </pc:sldMkLst>
-      </pc:sldChg>
-      <pc:sldChg chg="del">
-        <pc:chgData name="Stephen Deck" userId="d0abce2a322c43a5" providerId="LiveId" clId="{ADFD2B2D-6693-472B-9AA3-4F1E67DE2D0B}" dt="2018-04-22T14:42:46.569" v="141" actId="2696"/>
-        <pc:sldMkLst>
-          <pc:docMk/>
-          <pc:sldMk cId="2733044924" sldId="386"/>
-        </pc:sldMkLst>
-      </pc:sldChg>
-      <pc:sldChg chg="del">
-        <pc:chgData name="Stephen Deck" userId="d0abce2a322c43a5" providerId="LiveId" clId="{ADFD2B2D-6693-472B-9AA3-4F1E67DE2D0B}" dt="2018-04-22T14:42:46.594" v="142" actId="2696"/>
-        <pc:sldMkLst>
-          <pc:docMk/>
-          <pc:sldMk cId="3568275238" sldId="387"/>
-        </pc:sldMkLst>
-      </pc:sldChg>
-      <pc:sldChg chg="del">
-        <pc:chgData name="Stephen Deck" userId="d0abce2a322c43a5" providerId="LiveId" clId="{ADFD2B2D-6693-472B-9AA3-4F1E67DE2D0B}" dt="2018-04-22T14:42:46.632" v="144" actId="2696"/>
-        <pc:sldMkLst>
-          <pc:docMk/>
-          <pc:sldMk cId="3220758351" sldId="388"/>
-        </pc:sldMkLst>
-      </pc:sldChg>
-      <pc:sldChg chg="del">
-        <pc:chgData name="Stephen Deck" userId="d0abce2a322c43a5" providerId="LiveId" clId="{ADFD2B2D-6693-472B-9AA3-4F1E67DE2D0B}" dt="2018-04-22T14:42:46.614" v="143" actId="2696"/>
-        <pc:sldMkLst>
-          <pc:docMk/>
-          <pc:sldMk cId="1736159326" sldId="389"/>
-        </pc:sldMkLst>
-      </pc:sldChg>
-      <pc:sldChg chg="del">
-        <pc:chgData name="Stephen Deck" userId="d0abce2a322c43a5" providerId="LiveId" clId="{ADFD2B2D-6693-472B-9AA3-4F1E67DE2D0B}" dt="2018-04-22T14:42:46.655" v="145" actId="2696"/>
-        <pc:sldMkLst>
-          <pc:docMk/>
-          <pc:sldMk cId="1925846351" sldId="390"/>
-        </pc:sldMkLst>
-      </pc:sldChg>
-      <pc:sldChg chg="del">
-        <pc:chgData name="Stephen Deck" userId="d0abce2a322c43a5" providerId="LiveId" clId="{ADFD2B2D-6693-472B-9AA3-4F1E67DE2D0B}" dt="2018-04-22T14:42:47.234" v="169" actId="2696"/>
-        <pc:sldMkLst>
-          <pc:docMk/>
-          <pc:sldMk cId="2505900812" sldId="393"/>
-        </pc:sldMkLst>
-      </pc:sldChg>
-      <pc:sldChg chg="del">
-        <pc:chgData name="Stephen Deck" userId="d0abce2a322c43a5" providerId="LiveId" clId="{ADFD2B2D-6693-472B-9AA3-4F1E67DE2D0B}" dt="2018-04-22T14:42:47.299" v="172" actId="2696"/>
-        <pc:sldMkLst>
-          <pc:docMk/>
-          <pc:sldMk cId="536285060" sldId="394"/>
-        </pc:sldMkLst>
-      </pc:sldChg>
-      <pc:sldChg chg="del">
-        <pc:chgData name="Stephen Deck" userId="d0abce2a322c43a5" providerId="LiveId" clId="{ADFD2B2D-6693-472B-9AA3-4F1E67DE2D0B}" dt="2018-04-22T14:42:47.313" v="173" actId="2696"/>
-        <pc:sldMkLst>
-          <pc:docMk/>
-          <pc:sldMk cId="3199953633" sldId="395"/>
-        </pc:sldMkLst>
-      </pc:sldChg>
-      <pc:sldChg chg="del">
-        <pc:chgData name="Stephen Deck" userId="d0abce2a322c43a5" providerId="LiveId" clId="{ADFD2B2D-6693-472B-9AA3-4F1E67DE2D0B}" dt="2018-04-22T14:41:07.892" v="49" actId="2696"/>
-        <pc:sldMkLst>
-          <pc:docMk/>
-          <pc:sldMk cId="4023169222" sldId="396"/>
-        </pc:sldMkLst>
-      </pc:sldChg>
       <pc:sldChg chg="modSp">
         <pc:chgData name="Stephen Deck" userId="d0abce2a322c43a5" providerId="LiveId" clId="{ADFD2B2D-6693-472B-9AA3-4F1E67DE2D0B}" dt="2018-04-22T14:41:13.668" v="59" actId="20577"/>
         <pc:sldMkLst>
@@ -1085,111 +290,6 @@
             <ac:spMk id="2" creationId="{677F66F3-1F8E-42B4-B4F0-1CC6DCC774EB}"/>
           </ac:spMkLst>
         </pc:spChg>
-      </pc:sldChg>
-      <pc:sldChg chg="del">
-        <pc:chgData name="Stephen Deck" userId="d0abce2a322c43a5" providerId="LiveId" clId="{ADFD2B2D-6693-472B-9AA3-4F1E67DE2D0B}" dt="2018-04-22T14:42:46.521" v="139" actId="2696"/>
-        <pc:sldMkLst>
-          <pc:docMk/>
-          <pc:sldMk cId="2351863450" sldId="399"/>
-        </pc:sldMkLst>
-      </pc:sldChg>
-      <pc:sldChg chg="del">
-        <pc:chgData name="Stephen Deck" userId="d0abce2a322c43a5" providerId="LiveId" clId="{ADFD2B2D-6693-472B-9AA3-4F1E67DE2D0B}" dt="2018-04-22T14:42:46.786" v="151" actId="2696"/>
-        <pc:sldMkLst>
-          <pc:docMk/>
-          <pc:sldMk cId="2341519082" sldId="400"/>
-        </pc:sldMkLst>
-      </pc:sldChg>
-      <pc:sldChg chg="del">
-        <pc:chgData name="Stephen Deck" userId="d0abce2a322c43a5" providerId="LiveId" clId="{ADFD2B2D-6693-472B-9AA3-4F1E67DE2D0B}" dt="2018-04-22T14:41:07.175" v="24" actId="2696"/>
-        <pc:sldMkLst>
-          <pc:docMk/>
-          <pc:sldMk cId="1379903200" sldId="401"/>
-        </pc:sldMkLst>
-      </pc:sldChg>
-      <pc:sldChg chg="del">
-        <pc:chgData name="Stephen Deck" userId="d0abce2a322c43a5" providerId="LiveId" clId="{ADFD2B2D-6693-472B-9AA3-4F1E67DE2D0B}" dt="2018-04-22T14:41:07.265" v="27" actId="2696"/>
-        <pc:sldMkLst>
-          <pc:docMk/>
-          <pc:sldMk cId="3968954586" sldId="403"/>
-        </pc:sldMkLst>
-      </pc:sldChg>
-      <pc:sldChg chg="del">
-        <pc:chgData name="Stephen Deck" userId="d0abce2a322c43a5" providerId="LiveId" clId="{ADFD2B2D-6693-472B-9AA3-4F1E67DE2D0B}" dt="2018-04-22T14:41:07.291" v="28" actId="2696"/>
-        <pc:sldMkLst>
-          <pc:docMk/>
-          <pc:sldMk cId="2717268728" sldId="404"/>
-        </pc:sldMkLst>
-      </pc:sldChg>
-      <pc:sldChg chg="del">
-        <pc:chgData name="Stephen Deck" userId="d0abce2a322c43a5" providerId="LiveId" clId="{ADFD2B2D-6693-472B-9AA3-4F1E67DE2D0B}" dt="2018-04-22T14:41:07.198" v="25" actId="2696"/>
-        <pc:sldMkLst>
-          <pc:docMk/>
-          <pc:sldMk cId="304009755" sldId="406"/>
-        </pc:sldMkLst>
-      </pc:sldChg>
-      <pc:sldChg chg="del">
-        <pc:chgData name="Stephen Deck" userId="d0abce2a322c43a5" providerId="LiveId" clId="{ADFD2B2D-6693-472B-9AA3-4F1E67DE2D0B}" dt="2018-04-22T14:41:07.228" v="26" actId="2696"/>
-        <pc:sldMkLst>
-          <pc:docMk/>
-          <pc:sldMk cId="30967562" sldId="407"/>
-        </pc:sldMkLst>
-      </pc:sldChg>
-      <pc:sldChg chg="del">
-        <pc:chgData name="Stephen Deck" userId="d0abce2a322c43a5" providerId="LiveId" clId="{ADFD2B2D-6693-472B-9AA3-4F1E67DE2D0B}" dt="2018-04-22T14:42:47.217" v="168" actId="2696"/>
-        <pc:sldMkLst>
-          <pc:docMk/>
-          <pc:sldMk cId="2008997013" sldId="408"/>
-        </pc:sldMkLst>
-      </pc:sldChg>
-      <pc:sldChg chg="del">
-        <pc:chgData name="Stephen Deck" userId="d0abce2a322c43a5" providerId="LiveId" clId="{ADFD2B2D-6693-472B-9AA3-4F1E67DE2D0B}" dt="2018-04-22T14:42:46.814" v="152" actId="2696"/>
-        <pc:sldMkLst>
-          <pc:docMk/>
-          <pc:sldMk cId="2771391754" sldId="409"/>
-        </pc:sldMkLst>
-      </pc:sldChg>
-      <pc:sldChg chg="del">
-        <pc:chgData name="Stephen Deck" userId="d0abce2a322c43a5" providerId="LiveId" clId="{ADFD2B2D-6693-472B-9AA3-4F1E67DE2D0B}" dt="2018-04-22T14:42:46.835" v="153" actId="2696"/>
-        <pc:sldMkLst>
-          <pc:docMk/>
-          <pc:sldMk cId="159151764" sldId="410"/>
-        </pc:sldMkLst>
-      </pc:sldChg>
-      <pc:sldChg chg="del">
-        <pc:chgData name="Stephen Deck" userId="d0abce2a322c43a5" providerId="LiveId" clId="{ADFD2B2D-6693-472B-9AA3-4F1E67DE2D0B}" dt="2018-04-22T14:42:46.860" v="154" actId="2696"/>
-        <pc:sldMkLst>
-          <pc:docMk/>
-          <pc:sldMk cId="2717788714" sldId="411"/>
-        </pc:sldMkLst>
-      </pc:sldChg>
-      <pc:sldChg chg="del">
-        <pc:chgData name="Stephen Deck" userId="d0abce2a322c43a5" providerId="LiveId" clId="{ADFD2B2D-6693-472B-9AA3-4F1E67DE2D0B}" dt="2018-04-22T14:42:46.893" v="155" actId="2696"/>
-        <pc:sldMkLst>
-          <pc:docMk/>
-          <pc:sldMk cId="300913623" sldId="412"/>
-        </pc:sldMkLst>
-      </pc:sldChg>
-      <pc:sldChg chg="del">
-        <pc:chgData name="Stephen Deck" userId="d0abce2a322c43a5" providerId="LiveId" clId="{ADFD2B2D-6693-472B-9AA3-4F1E67DE2D0B}" dt="2018-04-22T14:42:46.926" v="156" actId="2696"/>
-        <pc:sldMkLst>
-          <pc:docMk/>
-          <pc:sldMk cId="37753624" sldId="413"/>
-        </pc:sldMkLst>
-      </pc:sldChg>
-      <pc:sldChg chg="del">
-        <pc:chgData name="Stephen Deck" userId="d0abce2a322c43a5" providerId="LiveId" clId="{ADFD2B2D-6693-472B-9AA3-4F1E67DE2D0B}" dt="2018-04-22T14:42:46.940" v="157" actId="2696"/>
-        <pc:sldMkLst>
-          <pc:docMk/>
-          <pc:sldMk cId="3704253232" sldId="414"/>
-        </pc:sldMkLst>
-      </pc:sldChg>
-      <pc:sldChg chg="del">
-        <pc:chgData name="Stephen Deck" userId="d0abce2a322c43a5" providerId="LiveId" clId="{ADFD2B2D-6693-472B-9AA3-4F1E67DE2D0B}" dt="2018-04-22T14:42:47.333" v="174" actId="2696"/>
-        <pc:sldMkLst>
-          <pc:docMk/>
-          <pc:sldMk cId="1412416080" sldId="415"/>
-        </pc:sldMkLst>
       </pc:sldChg>
       <pc:sldChg chg="modSp">
         <pc:chgData name="Stephen Deck" userId="d0abce2a322c43a5" providerId="LiveId" clId="{ADFD2B2D-6693-472B-9AA3-4F1E67DE2D0B}" dt="2018-04-22T14:42:53.917" v="194" actId="20577"/>
@@ -1221,48 +321,6 @@
           </ac:spMkLst>
         </pc:spChg>
       </pc:sldChg>
-      <pc:sldChg chg="del">
-        <pc:chgData name="Stephen Deck" userId="d0abce2a322c43a5" providerId="LiveId" clId="{ADFD2B2D-6693-472B-9AA3-4F1E67DE2D0B}" dt="2018-04-22T14:42:46.962" v="158" actId="2696"/>
-        <pc:sldMkLst>
-          <pc:docMk/>
-          <pc:sldMk cId="1404534399" sldId="422"/>
-        </pc:sldMkLst>
-      </pc:sldChg>
-      <pc:sldChg chg="del">
-        <pc:chgData name="Stephen Deck" userId="d0abce2a322c43a5" providerId="LiveId" clId="{ADFD2B2D-6693-472B-9AA3-4F1E67DE2D0B}" dt="2018-04-22T14:42:46.987" v="159" actId="2696"/>
-        <pc:sldMkLst>
-          <pc:docMk/>
-          <pc:sldMk cId="765347730" sldId="423"/>
-        </pc:sldMkLst>
-      </pc:sldChg>
-      <pc:sldChg chg="del">
-        <pc:chgData name="Stephen Deck" userId="d0abce2a322c43a5" providerId="LiveId" clId="{ADFD2B2D-6693-472B-9AA3-4F1E67DE2D0B}" dt="2018-04-22T14:42:47.100" v="163" actId="2696"/>
-        <pc:sldMkLst>
-          <pc:docMk/>
-          <pc:sldMk cId="414069689" sldId="424"/>
-        </pc:sldMkLst>
-      </pc:sldChg>
-      <pc:sldChg chg="del">
-        <pc:chgData name="Stephen Deck" userId="d0abce2a322c43a5" providerId="LiveId" clId="{ADFD2B2D-6693-472B-9AA3-4F1E67DE2D0B}" dt="2018-04-22T14:42:47.132" v="164" actId="2696"/>
-        <pc:sldMkLst>
-          <pc:docMk/>
-          <pc:sldMk cId="2421899165" sldId="425"/>
-        </pc:sldMkLst>
-      </pc:sldChg>
-      <pc:sldChg chg="del">
-        <pc:chgData name="Stephen Deck" userId="d0abce2a322c43a5" providerId="LiveId" clId="{ADFD2B2D-6693-472B-9AA3-4F1E67DE2D0B}" dt="2018-04-22T14:42:47.184" v="166" actId="2696"/>
-        <pc:sldMkLst>
-          <pc:docMk/>
-          <pc:sldMk cId="638987927" sldId="426"/>
-        </pc:sldMkLst>
-      </pc:sldChg>
-      <pc:sldChg chg="del">
-        <pc:chgData name="Stephen Deck" userId="d0abce2a322c43a5" providerId="LiveId" clId="{ADFD2B2D-6693-472B-9AA3-4F1E67DE2D0B}" dt="2018-04-22T14:42:47.257" v="170" actId="2696"/>
-        <pc:sldMkLst>
-          <pc:docMk/>
-          <pc:sldMk cId="3948489456" sldId="427"/>
-        </pc:sldMkLst>
-      </pc:sldChg>
       <pc:sldChg chg="modSp">
         <pc:chgData name="Stephen Deck" userId="d0abce2a322c43a5" providerId="LiveId" clId="{ADFD2B2D-6693-472B-9AA3-4F1E67DE2D0B}" dt="2018-04-22T14:43:03.037" v="219" actId="20577"/>
         <pc:sldMkLst>
@@ -1278,84 +336,14 @@
           </ac:spMkLst>
         </pc:spChg>
       </pc:sldChg>
-      <pc:sldChg chg="del">
-        <pc:chgData name="Stephen Deck" userId="d0abce2a322c43a5" providerId="LiveId" clId="{ADFD2B2D-6693-472B-9AA3-4F1E67DE2D0B}" dt="2018-04-22T14:42:47.281" v="171" actId="2696"/>
-        <pc:sldMkLst>
-          <pc:docMk/>
-          <pc:sldMk cId="3157426562" sldId="429"/>
-        </pc:sldMkLst>
-      </pc:sldChg>
-      <pc:sldChg chg="del">
-        <pc:chgData name="Stephen Deck" userId="d0abce2a322c43a5" providerId="LiveId" clId="{ADFD2B2D-6693-472B-9AA3-4F1E67DE2D0B}" dt="2018-04-22T14:42:47.017" v="160" actId="2696"/>
-        <pc:sldMkLst>
-          <pc:docMk/>
-          <pc:sldMk cId="382828433" sldId="432"/>
-        </pc:sldMkLst>
-      </pc:sldChg>
-      <pc:sldChg chg="del">
-        <pc:chgData name="Stephen Deck" userId="d0abce2a322c43a5" providerId="LiveId" clId="{ADFD2B2D-6693-472B-9AA3-4F1E67DE2D0B}" dt="2018-04-22T14:42:47.072" v="162" actId="2696"/>
-        <pc:sldMkLst>
-          <pc:docMk/>
-          <pc:sldMk cId="25048554" sldId="433"/>
-        </pc:sldMkLst>
-      </pc:sldChg>
-      <pc:sldChg chg="del">
-        <pc:chgData name="Stephen Deck" userId="d0abce2a322c43a5" providerId="LiveId" clId="{ADFD2B2D-6693-472B-9AA3-4F1E67DE2D0B}" dt="2018-04-22T14:42:47.044" v="161" actId="2696"/>
-        <pc:sldMkLst>
-          <pc:docMk/>
-          <pc:sldMk cId="1359609486" sldId="434"/>
-        </pc:sldMkLst>
-      </pc:sldChg>
-      <pc:sldChg chg="del">
-        <pc:chgData name="Stephen Deck" userId="d0abce2a322c43a5" providerId="LiveId" clId="{ADFD2B2D-6693-472B-9AA3-4F1E67DE2D0B}" dt="2018-04-22T14:42:46.683" v="146" actId="2696"/>
-        <pc:sldMkLst>
-          <pc:docMk/>
-          <pc:sldMk cId="1207566757" sldId="435"/>
-        </pc:sldMkLst>
-      </pc:sldChg>
-      <pc:sldChg chg="del">
-        <pc:chgData name="Stephen Deck" userId="d0abce2a322c43a5" providerId="LiveId" clId="{ADFD2B2D-6693-472B-9AA3-4F1E67DE2D0B}" dt="2018-04-22T14:42:46.700" v="147" actId="2696"/>
-        <pc:sldMkLst>
-          <pc:docMk/>
-          <pc:sldMk cId="4059609398" sldId="436"/>
-        </pc:sldMkLst>
-      </pc:sldChg>
-      <pc:sldChg chg="del">
-        <pc:chgData name="Stephen Deck" userId="d0abce2a322c43a5" providerId="LiveId" clId="{ADFD2B2D-6693-472B-9AA3-4F1E67DE2D0B}" dt="2018-04-22T14:42:46.723" v="148" actId="2696"/>
-        <pc:sldMkLst>
-          <pc:docMk/>
-          <pc:sldMk cId="770554393" sldId="437"/>
-        </pc:sldMkLst>
-      </pc:sldChg>
-      <pc:sldChg chg="del">
-        <pc:chgData name="Stephen Deck" userId="d0abce2a322c43a5" providerId="LiveId" clId="{ADFD2B2D-6693-472B-9AA3-4F1E67DE2D0B}" dt="2018-04-22T14:42:46.744" v="149" actId="2696"/>
-        <pc:sldMkLst>
-          <pc:docMk/>
-          <pc:sldMk cId="2371717314" sldId="438"/>
-        </pc:sldMkLst>
-      </pc:sldChg>
-      <pc:sldChg chg="del">
-        <pc:chgData name="Stephen Deck" userId="d0abce2a322c43a5" providerId="LiveId" clId="{ADFD2B2D-6693-472B-9AA3-4F1E67DE2D0B}" dt="2018-04-22T14:42:46.760" v="150" actId="2696"/>
-        <pc:sldMkLst>
-          <pc:docMk/>
-          <pc:sldMk cId="3953669788" sldId="439"/>
-        </pc:sldMkLst>
-      </pc:sldChg>
-      <pc:sldChg chg="del">
-        <pc:chgData name="Stephen Deck" userId="d0abce2a322c43a5" providerId="LiveId" clId="{ADFD2B2D-6693-472B-9AA3-4F1E67DE2D0B}" dt="2018-04-22T14:42:47.157" v="165" actId="2696"/>
-        <pc:sldMkLst>
-          <pc:docMk/>
-          <pc:sldMk cId="2733668720" sldId="440"/>
-        </pc:sldMkLst>
-      </pc:sldChg>
       <pc:sldChg chg="modSp">
-        <pc:chgData name="Stephen Deck" userId="d0abce2a322c43a5" providerId="LiveId" clId="{ADFD2B2D-6693-472B-9AA3-4F1E67DE2D0B}" dt="2018-04-22T14:43:13.717" v="234"/>
+        <pc:chgData name="Stephen Deck" userId="d0abce2a322c43a5" providerId="LiveId" clId="{ADFD2B2D-6693-472B-9AA3-4F1E67DE2D0B}" dt="2018-04-22T14:43:13.717" v="234" actId="2696"/>
         <pc:sldMkLst>
           <pc:docMk/>
           <pc:sldMk cId="2742684266" sldId="441"/>
         </pc:sldMkLst>
         <pc:spChg chg="mod">
-          <ac:chgData name="Stephen Deck" userId="d0abce2a322c43a5" providerId="LiveId" clId="{ADFD2B2D-6693-472B-9AA3-4F1E67DE2D0B}" dt="2018-04-22T14:43:13.717" v="234"/>
+          <ac:chgData name="Stephen Deck" userId="d0abce2a322c43a5" providerId="LiveId" clId="{ADFD2B2D-6693-472B-9AA3-4F1E67DE2D0B}" dt="2018-04-22T14:43:13.717" v="234" actId="2696"/>
           <ac:spMkLst>
             <pc:docMk/>
             <pc:sldMk cId="2742684266" sldId="441"/>
@@ -1363,28 +351,14 @@
           </ac:spMkLst>
         </pc:spChg>
       </pc:sldChg>
-      <pc:sldChg chg="del">
-        <pc:chgData name="Stephen Deck" userId="d0abce2a322c43a5" providerId="LiveId" clId="{ADFD2B2D-6693-472B-9AA3-4F1E67DE2D0B}" dt="2018-04-22T14:42:46.030" v="119" actId="2696"/>
-        <pc:sldMkLst>
-          <pc:docMk/>
-          <pc:sldMk cId="486904506" sldId="442"/>
-        </pc:sldMkLst>
-      </pc:sldChg>
-      <pc:sldChg chg="del">
-        <pc:chgData name="Stephen Deck" userId="d0abce2a322c43a5" providerId="LiveId" clId="{ADFD2B2D-6693-472B-9AA3-4F1E67DE2D0B}" dt="2018-04-22T14:42:46.301" v="130" actId="2696"/>
-        <pc:sldMkLst>
-          <pc:docMk/>
-          <pc:sldMk cId="3110816959" sldId="443"/>
-        </pc:sldMkLst>
-      </pc:sldChg>
       <pc:sldChg chg="modSp">
-        <pc:chgData name="Stephen Deck" userId="d0abce2a322c43a5" providerId="LiveId" clId="{ADFD2B2D-6693-472B-9AA3-4F1E67DE2D0B}" dt="2018-04-22T14:43:47.634" v="284"/>
+        <pc:chgData name="Stephen Deck" userId="d0abce2a322c43a5" providerId="LiveId" clId="{ADFD2B2D-6693-472B-9AA3-4F1E67DE2D0B}" dt="2018-04-22T14:43:47.634" v="284" actId="2696"/>
         <pc:sldMkLst>
           <pc:docMk/>
           <pc:sldMk cId="439708885" sldId="444"/>
         </pc:sldMkLst>
         <pc:spChg chg="mod">
-          <ac:chgData name="Stephen Deck" userId="d0abce2a322c43a5" providerId="LiveId" clId="{ADFD2B2D-6693-472B-9AA3-4F1E67DE2D0B}" dt="2018-04-22T14:43:47.634" v="284"/>
+          <ac:chgData name="Stephen Deck" userId="d0abce2a322c43a5" providerId="LiveId" clId="{ADFD2B2D-6693-472B-9AA3-4F1E67DE2D0B}" dt="2018-04-22T14:43:47.634" v="284" actId="2696"/>
           <ac:spMkLst>
             <pc:docMk/>
             <pc:sldMk cId="439708885" sldId="444"/>
@@ -1393,13 +367,13 @@
         </pc:spChg>
       </pc:sldChg>
       <pc:sldChg chg="modSp">
-        <pc:chgData name="Stephen Deck" userId="d0abce2a322c43a5" providerId="LiveId" clId="{ADFD2B2D-6693-472B-9AA3-4F1E67DE2D0B}" dt="2018-04-22T14:43:54.413" v="286"/>
+        <pc:chgData name="Stephen Deck" userId="d0abce2a322c43a5" providerId="LiveId" clId="{ADFD2B2D-6693-472B-9AA3-4F1E67DE2D0B}" dt="2018-04-22T14:43:54.413" v="286" actId="2696"/>
         <pc:sldMkLst>
           <pc:docMk/>
           <pc:sldMk cId="3509323785" sldId="445"/>
         </pc:sldMkLst>
         <pc:spChg chg="mod">
-          <ac:chgData name="Stephen Deck" userId="d0abce2a322c43a5" providerId="LiveId" clId="{ADFD2B2D-6693-472B-9AA3-4F1E67DE2D0B}" dt="2018-04-22T14:43:54.413" v="286"/>
+          <ac:chgData name="Stephen Deck" userId="d0abce2a322c43a5" providerId="LiveId" clId="{ADFD2B2D-6693-472B-9AA3-4F1E67DE2D0B}" dt="2018-04-22T14:43:54.413" v="286" actId="2696"/>
           <ac:spMkLst>
             <pc:docMk/>
             <pc:sldMk cId="3509323785" sldId="445"/>
@@ -1408,13 +382,13 @@
         </pc:spChg>
       </pc:sldChg>
       <pc:sldChg chg="modSp">
-        <pc:chgData name="Stephen Deck" userId="d0abce2a322c43a5" providerId="LiveId" clId="{ADFD2B2D-6693-472B-9AA3-4F1E67DE2D0B}" dt="2018-04-22T14:43:59.713" v="288"/>
+        <pc:chgData name="Stephen Deck" userId="d0abce2a322c43a5" providerId="LiveId" clId="{ADFD2B2D-6693-472B-9AA3-4F1E67DE2D0B}" dt="2018-04-22T14:43:59.713" v="288" actId="2696"/>
         <pc:sldMkLst>
           <pc:docMk/>
           <pc:sldMk cId="1179380902" sldId="446"/>
         </pc:sldMkLst>
         <pc:spChg chg="mod">
-          <ac:chgData name="Stephen Deck" userId="d0abce2a322c43a5" providerId="LiveId" clId="{ADFD2B2D-6693-472B-9AA3-4F1E67DE2D0B}" dt="2018-04-22T14:43:59.713" v="288"/>
+          <ac:chgData name="Stephen Deck" userId="d0abce2a322c43a5" providerId="LiveId" clId="{ADFD2B2D-6693-472B-9AA3-4F1E67DE2D0B}" dt="2018-04-22T14:43:59.713" v="288" actId="2696"/>
           <ac:spMkLst>
             <pc:docMk/>
             <pc:sldMk cId="1179380902" sldId="446"/>
@@ -1423,13 +397,13 @@
         </pc:spChg>
       </pc:sldChg>
       <pc:sldChg chg="modSp">
-        <pc:chgData name="Stephen Deck" userId="d0abce2a322c43a5" providerId="LiveId" clId="{ADFD2B2D-6693-472B-9AA3-4F1E67DE2D0B}" dt="2018-04-22T14:44:05.299" v="290"/>
+        <pc:chgData name="Stephen Deck" userId="d0abce2a322c43a5" providerId="LiveId" clId="{ADFD2B2D-6693-472B-9AA3-4F1E67DE2D0B}" dt="2018-04-22T14:44:05.299" v="290" actId="2696"/>
         <pc:sldMkLst>
           <pc:docMk/>
           <pc:sldMk cId="1997960080" sldId="447"/>
         </pc:sldMkLst>
         <pc:spChg chg="mod">
-          <ac:chgData name="Stephen Deck" userId="d0abce2a322c43a5" providerId="LiveId" clId="{ADFD2B2D-6693-472B-9AA3-4F1E67DE2D0B}" dt="2018-04-22T14:44:05.299" v="290"/>
+          <ac:chgData name="Stephen Deck" userId="d0abce2a322c43a5" providerId="LiveId" clId="{ADFD2B2D-6693-472B-9AA3-4F1E67DE2D0B}" dt="2018-04-22T14:44:05.299" v="290" actId="2696"/>
           <ac:spMkLst>
             <pc:docMk/>
             <pc:sldMk cId="1997960080" sldId="447"/>
@@ -1437,111 +411,12 @@
           </ac:spMkLst>
         </pc:spChg>
       </pc:sldChg>
-      <pc:sldChg chg="del">
-        <pc:chgData name="Stephen Deck" userId="d0abce2a322c43a5" providerId="LiveId" clId="{ADFD2B2D-6693-472B-9AA3-4F1E67DE2D0B}" dt="2018-04-22T14:41:07.343" v="30" actId="2696"/>
-        <pc:sldMkLst>
-          <pc:docMk/>
-          <pc:sldMk cId="2520845146" sldId="460"/>
-        </pc:sldMkLst>
-      </pc:sldChg>
-      <pc:sldChg chg="del">
-        <pc:chgData name="Stephen Deck" userId="d0abce2a322c43a5" providerId="LiveId" clId="{ADFD2B2D-6693-472B-9AA3-4F1E67DE2D0B}" dt="2018-04-22T14:41:07.519" v="36" actId="2696"/>
-        <pc:sldMkLst>
-          <pc:docMk/>
-          <pc:sldMk cId="1316418490" sldId="461"/>
-        </pc:sldMkLst>
-      </pc:sldChg>
-      <pc:sldChg chg="del">
-        <pc:chgData name="Stephen Deck" userId="d0abce2a322c43a5" providerId="LiveId" clId="{ADFD2B2D-6693-472B-9AA3-4F1E67DE2D0B}" dt="2018-04-22T14:41:07.601" v="39" actId="2696"/>
-        <pc:sldMkLst>
-          <pc:docMk/>
-          <pc:sldMk cId="58854909" sldId="462"/>
-        </pc:sldMkLst>
-      </pc:sldChg>
-      <pc:sldChg chg="del">
-        <pc:chgData name="Stephen Deck" userId="d0abce2a322c43a5" providerId="LiveId" clId="{ADFD2B2D-6693-472B-9AA3-4F1E67DE2D0B}" dt="2018-04-22T14:41:07.574" v="38" actId="2696"/>
-        <pc:sldMkLst>
-          <pc:docMk/>
-          <pc:sldMk cId="3244318879" sldId="463"/>
-        </pc:sldMkLst>
-      </pc:sldChg>
-      <pc:sldChg chg="del">
-        <pc:chgData name="Stephen Deck" userId="d0abce2a322c43a5" providerId="LiveId" clId="{ADFD2B2D-6693-472B-9AA3-4F1E67DE2D0B}" dt="2018-04-22T14:41:07.545" v="37" actId="2696"/>
-        <pc:sldMkLst>
-          <pc:docMk/>
-          <pc:sldMk cId="1896849846" sldId="464"/>
-        </pc:sldMkLst>
-      </pc:sldChg>
-      <pc:sldChg chg="del">
-        <pc:chgData name="Stephen Deck" userId="d0abce2a322c43a5" providerId="LiveId" clId="{ADFD2B2D-6693-472B-9AA3-4F1E67DE2D0B}" dt="2018-04-22T14:42:47.199" v="167" actId="2696"/>
-        <pc:sldMkLst>
-          <pc:docMk/>
-          <pc:sldMk cId="677845411" sldId="465"/>
-        </pc:sldMkLst>
-      </pc:sldChg>
-      <pc:sldChg chg="del">
-        <pc:chgData name="Stephen Deck" userId="d0abce2a322c43a5" providerId="LiveId" clId="{ADFD2B2D-6693-472B-9AA3-4F1E67DE2D0B}" dt="2018-04-22T14:42:05.365" v="113" actId="2696"/>
-        <pc:sldMkLst>
-          <pc:docMk/>
-          <pc:sldMk cId="3464729142" sldId="467"/>
-        </pc:sldMkLst>
-      </pc:sldChg>
-      <pc:sldChg chg="del">
-        <pc:chgData name="Stephen Deck" userId="d0abce2a322c43a5" providerId="LiveId" clId="{ADFD2B2D-6693-472B-9AA3-4F1E67DE2D0B}" dt="2018-04-22T14:42:04.847" v="94" actId="2696"/>
-        <pc:sldMkLst>
-          <pc:docMk/>
-          <pc:sldMk cId="101173943" sldId="468"/>
-        </pc:sldMkLst>
-      </pc:sldChg>
-      <pc:sldChg chg="del">
-        <pc:chgData name="Stephen Deck" userId="d0abce2a322c43a5" providerId="LiveId" clId="{ADFD2B2D-6693-472B-9AA3-4F1E67DE2D0B}" dt="2018-04-22T14:42:05.271" v="110" actId="2696"/>
-        <pc:sldMkLst>
-          <pc:docMk/>
-          <pc:sldMk cId="759969192" sldId="469"/>
-        </pc:sldMkLst>
-      </pc:sldChg>
-      <pc:sldChg chg="del">
-        <pc:chgData name="Stephen Deck" userId="d0abce2a322c43a5" providerId="LiveId" clId="{ADFD2B2D-6693-472B-9AA3-4F1E67DE2D0B}" dt="2018-04-22T14:41:07.638" v="40" actId="2696"/>
-        <pc:sldMkLst>
-          <pc:docMk/>
-          <pc:sldMk cId="1192982503" sldId="470"/>
-        </pc:sldMkLst>
-      </pc:sldChg>
-      <pc:sldChg chg="del">
-        <pc:chgData name="Stephen Deck" userId="d0abce2a322c43a5" providerId="LiveId" clId="{ADFD2B2D-6693-472B-9AA3-4F1E67DE2D0B}" dt="2018-04-22T14:41:07.318" v="29" actId="2696"/>
-        <pc:sldMkLst>
-          <pc:docMk/>
-          <pc:sldMk cId="3971661310" sldId="471"/>
-        </pc:sldMkLst>
-      </pc:sldChg>
-      <pc:sldChg chg="del">
-        <pc:chgData name="Stephen Deck" userId="d0abce2a322c43a5" providerId="LiveId" clId="{ADFD2B2D-6693-472B-9AA3-4F1E67DE2D0B}" dt="2018-04-22T14:42:05.303" v="111" actId="2696"/>
-        <pc:sldMkLst>
-          <pc:docMk/>
-          <pc:sldMk cId="1775319140" sldId="479"/>
-        </pc:sldMkLst>
-      </pc:sldChg>
-      <pc:sldChg chg="del">
-        <pc:chgData name="Stephen Deck" userId="d0abce2a322c43a5" providerId="LiveId" clId="{ADFD2B2D-6693-472B-9AA3-4F1E67DE2D0B}" dt="2018-04-22T14:42:45.989" v="118" actId="2696"/>
-        <pc:sldMkLst>
-          <pc:docMk/>
-          <pc:sldMk cId="3764509142" sldId="480"/>
-        </pc:sldMkLst>
-      </pc:sldChg>
       <pc:sldMasterChg chg="delSldLayout">
         <pc:chgData name="Stephen Deck" userId="d0abce2a322c43a5" providerId="LiveId" clId="{ADFD2B2D-6693-472B-9AA3-4F1E67DE2D0B}" dt="2018-04-22T14:42:47.334" v="175" actId="2696"/>
         <pc:sldMasterMkLst>
           <pc:docMk/>
           <pc:sldMasterMk cId="1381684232" sldId="2147483660"/>
         </pc:sldMasterMkLst>
-        <pc:sldLayoutChg chg="del">
-          <pc:chgData name="Stephen Deck" userId="d0abce2a322c43a5" providerId="LiveId" clId="{ADFD2B2D-6693-472B-9AA3-4F1E67DE2D0B}" dt="2018-04-22T14:42:47.334" v="175" actId="2696"/>
-          <pc:sldLayoutMkLst>
-            <pc:docMk/>
-            <pc:sldMasterMk cId="1381684232" sldId="2147483660"/>
-            <pc:sldLayoutMk cId="1901946306" sldId="2147483686"/>
-          </pc:sldLayoutMkLst>
-        </pc:sldLayoutChg>
       </pc:sldMasterChg>
     </pc:docChg>
   </pc:docChgLst>
@@ -1635,7 +510,7 @@
             <a:fld id="{F0A6AF3A-C228-024A-8C2E-6E0FCC8DEC76}" type="datetimeFigureOut">
               <a:rPr lang="en-US" smtClean="0"/>
               <a:pPr/>
-              <a:t>4/21/2018</a:t>
+              <a:t>4/23/2018</a:t>
             </a:fld>
             <a:endParaRPr lang="en-US" dirty="0"/>
           </a:p>
@@ -2059,7 +934,7 @@
           <a:p>
             <a:fld id="{869A38CF-E133-2243-90F7-979D11E866BA}" type="datetime4">
               <a:rPr lang="en-US" smtClean="0"/>
-              <a:t>April 21, 2018</a:t>
+              <a:t>April 23, 2018</a:t>
             </a:fld>
             <a:endParaRPr lang="en-CA" dirty="0"/>
           </a:p>
@@ -2336,7 +1211,7 @@
           <a:p>
             <a:fld id="{869A38CF-E133-2243-90F7-979D11E866BA}" type="datetime4">
               <a:rPr lang="en-US" smtClean="0"/>
-              <a:t>April 21, 2018</a:t>
+              <a:t>April 23, 2018</a:t>
             </a:fld>
             <a:endParaRPr lang="en-CA" dirty="0"/>
           </a:p>
@@ -2601,7 +1476,7 @@
           <a:p>
             <a:fld id="{869A38CF-E133-2243-90F7-979D11E866BA}" type="datetime4">
               <a:rPr lang="en-US" smtClean="0"/>
-              <a:t>April 21, 2018</a:t>
+              <a:t>April 23, 2018</a:t>
             </a:fld>
             <a:endParaRPr lang="en-CA" dirty="0"/>
           </a:p>
@@ -2809,7 +1684,7 @@
             <a:fld id="{869A38CF-E133-2243-90F7-979D11E866BA}" type="datetime4">
               <a:rPr lang="en-US" smtClean="0"/>
               <a:pPr/>
-              <a:t>April 21, 2018</a:t>
+              <a:t>April 23, 2018</a:t>
             </a:fld>
             <a:endParaRPr lang="en-CA" dirty="0"/>
           </a:p>
@@ -3138,7 +2013,7 @@
             <a:fld id="{869A38CF-E133-2243-90F7-979D11E866BA}" type="datetime4">
               <a:rPr lang="en-US" smtClean="0"/>
               <a:pPr/>
-              <a:t>April 21, 2018</a:t>
+              <a:t>April 23, 2018</a:t>
             </a:fld>
             <a:endParaRPr lang="en-CA" dirty="0"/>
           </a:p>
@@ -3489,7 +2364,7 @@
             <a:fld id="{869A38CF-E133-2243-90F7-979D11E866BA}" type="datetime4">
               <a:rPr lang="en-US" smtClean="0"/>
               <a:pPr/>
-              <a:t>April 21, 2018</a:t>
+              <a:t>April 23, 2018</a:t>
             </a:fld>
             <a:endParaRPr lang="en-CA" dirty="0"/>
           </a:p>
@@ -3765,7 +2640,7 @@
             <a:fld id="{869A38CF-E133-2243-90F7-979D11E866BA}" type="datetime4">
               <a:rPr lang="en-US" smtClean="0"/>
               <a:pPr/>
-              <a:t>April 21, 2018</a:t>
+              <a:t>April 23, 2018</a:t>
             </a:fld>
             <a:endParaRPr lang="en-CA" dirty="0"/>
           </a:p>
@@ -3956,7 +2831,7 @@
             <a:fld id="{869A38CF-E133-2243-90F7-979D11E866BA}" type="datetime4">
               <a:rPr lang="en-US" smtClean="0"/>
               <a:pPr/>
-              <a:t>April 21, 2018</a:t>
+              <a:t>April 23, 2018</a:t>
             </a:fld>
             <a:endParaRPr lang="en-CA" dirty="0"/>
           </a:p>
@@ -4191,7 +3066,7 @@
             <a:fld id="{869A38CF-E133-2243-90F7-979D11E866BA}" type="datetime4">
               <a:rPr lang="en-US" smtClean="0"/>
               <a:pPr/>
-              <a:t>April 21, 2018</a:t>
+              <a:t>April 23, 2018</a:t>
             </a:fld>
             <a:endParaRPr lang="en-CA" dirty="0"/>
           </a:p>
@@ -4402,7 +3277,7 @@
             <a:fld id="{869A38CF-E133-2243-90F7-979D11E866BA}" type="datetime4">
               <a:rPr lang="en-US" smtClean="0"/>
               <a:pPr/>
-              <a:t>April 21, 2018</a:t>
+              <a:t>April 23, 2018</a:t>
             </a:fld>
             <a:endParaRPr lang="en-CA" dirty="0"/>
           </a:p>
@@ -4726,7 +3601,7 @@
             <a:fld id="{869A38CF-E133-2243-90F7-979D11E866BA}" type="datetime4">
               <a:rPr lang="en-US" smtClean="0"/>
               <a:pPr/>
-              <a:t>April 21, 2018</a:t>
+              <a:t>April 23, 2018</a:t>
             </a:fld>
             <a:endParaRPr lang="en-CA" dirty="0"/>
           </a:p>
@@ -4862,7 +3737,7 @@
           <a:p>
             <a:fld id="{869A38CF-E133-2243-90F7-979D11E866BA}" type="datetime4">
               <a:rPr lang="en-US" smtClean="0"/>
-              <a:t>April 21, 2018</a:t>
+              <a:t>April 23, 2018</a:t>
             </a:fld>
             <a:endParaRPr lang="en-CA" dirty="0"/>
           </a:p>
@@ -5239,7 +4114,7 @@
             <a:fld id="{869A38CF-E133-2243-90F7-979D11E866BA}" type="datetime4">
               <a:rPr lang="en-US" smtClean="0"/>
               <a:pPr/>
-              <a:t>April 21, 2018</a:t>
+              <a:t>April 23, 2018</a:t>
             </a:fld>
             <a:endParaRPr lang="en-CA" dirty="0"/>
           </a:p>
@@ -5376,7 +4251,7 @@
             <a:fld id="{869A38CF-E133-2243-90F7-979D11E866BA}" type="datetime4">
               <a:rPr lang="en-US" smtClean="0"/>
               <a:pPr/>
-              <a:t>April 21, 2018</a:t>
+              <a:t>April 23, 2018</a:t>
             </a:fld>
             <a:endParaRPr lang="en-CA" dirty="0"/>
           </a:p>
@@ -5601,7 +4476,7 @@
             <a:fld id="{869A38CF-E133-2243-90F7-979D11E866BA}" type="datetime4">
               <a:rPr lang="en-US" smtClean="0"/>
               <a:pPr/>
-              <a:t>April 21, 2018</a:t>
+              <a:t>April 23, 2018</a:t>
             </a:fld>
             <a:endParaRPr lang="en-CA" dirty="0"/>
           </a:p>
@@ -5924,7 +4799,7 @@
           <a:p>
             <a:fld id="{869A38CF-E133-2243-90F7-979D11E866BA}" type="datetime4">
               <a:rPr lang="en-US" smtClean="0"/>
-              <a:t>April 21, 2018</a:t>
+              <a:t>April 23, 2018</a:t>
             </a:fld>
             <a:endParaRPr lang="en-CA" dirty="0"/>
           </a:p>
@@ -6187,7 +5062,7 @@
           <a:p>
             <a:fld id="{869A38CF-E133-2243-90F7-979D11E866BA}" type="datetime4">
               <a:rPr lang="en-US" smtClean="0"/>
-              <a:t>April 21, 2018</a:t>
+              <a:t>April 23, 2018</a:t>
             </a:fld>
             <a:endParaRPr lang="en-CA" dirty="0"/>
           </a:p>
@@ -6554,7 +5429,7 @@
           <a:p>
             <a:fld id="{869A38CF-E133-2243-90F7-979D11E866BA}" type="datetime4">
               <a:rPr lang="en-US" smtClean="0"/>
-              <a:t>April 21, 2018</a:t>
+              <a:t>April 23, 2018</a:t>
             </a:fld>
             <a:endParaRPr lang="en-CA" dirty="0"/>
           </a:p>
@@ -6753,7 +5628,7 @@
           <a:p>
             <a:fld id="{869A38CF-E133-2243-90F7-979D11E866BA}" type="datetime4">
               <a:rPr lang="en-US" smtClean="0"/>
-              <a:t>April 21, 2018</a:t>
+              <a:t>April 23, 2018</a:t>
             </a:fld>
             <a:endParaRPr lang="en-CA" dirty="0"/>
           </a:p>
@@ -7349,7 +6224,7 @@
           <a:p>
             <a:fld id="{869A38CF-E133-2243-90F7-979D11E866BA}" type="datetime4">
               <a:rPr lang="en-US" smtClean="0"/>
-              <a:t>April 21, 2018</a:t>
+              <a:t>April 23, 2018</a:t>
             </a:fld>
             <a:endParaRPr lang="en-CA" dirty="0"/>
           </a:p>
@@ -7475,7 +6350,7 @@
           <a:p>
             <a:fld id="{869A38CF-E133-2243-90F7-979D11E866BA}" type="datetime4">
               <a:rPr lang="en-US" smtClean="0"/>
-              <a:t>April 21, 2018</a:t>
+              <a:t>April 23, 2018</a:t>
             </a:fld>
             <a:endParaRPr lang="en-CA" dirty="0"/>
           </a:p>
@@ -7579,7 +6454,7 @@
           <a:p>
             <a:fld id="{869A38CF-E133-2243-90F7-979D11E866BA}" type="datetime4">
               <a:rPr lang="en-US" smtClean="0"/>
-              <a:t>April 21, 2018</a:t>
+              <a:t>April 23, 2018</a:t>
             </a:fld>
             <a:endParaRPr lang="en-CA" dirty="0"/>
           </a:p>
@@ -7805,7 +6680,7 @@
           <a:p>
             <a:fld id="{869A38CF-E133-2243-90F7-979D11E866BA}" type="datetime4">
               <a:rPr lang="en-US" smtClean="0"/>
-              <a:t>April 21, 2018</a:t>
+              <a:t>April 23, 2018</a:t>
             </a:fld>
             <a:endParaRPr lang="en-CA" dirty="0"/>
           </a:p>
@@ -8391,7 +7266,7 @@
             <a:fld id="{869A38CF-E133-2243-90F7-979D11E866BA}" type="datetime4">
               <a:rPr lang="en-US" smtClean="0"/>
               <a:pPr/>
-              <a:t>April 21, 2018</a:t>
+              <a:t>April 23, 2018</a:t>
             </a:fld>
             <a:endParaRPr lang="en-CA" dirty="0"/>
           </a:p>
@@ -8962,7 +7837,7 @@
           <a:p>
             <a:fld id="{869A38CF-E133-2243-90F7-979D11E866BA}" type="datetime4">
               <a:rPr lang="en-US" smtClean="0"/>
-              <a:t>April 21, 2018</a:t>
+              <a:t>April 23, 2018</a:t>
             </a:fld>
             <a:endParaRPr lang="en-CA" dirty="0"/>
           </a:p>
@@ -9079,7 +7954,7 @@
           <a:p>
             <a:fld id="{869A38CF-E133-2243-90F7-979D11E866BA}" type="datetime4">
               <a:rPr lang="en-US" smtClean="0"/>
-              <a:t>April 21, 2018</a:t>
+              <a:t>April 23, 2018</a:t>
             </a:fld>
             <a:endParaRPr lang="en-CA" dirty="0"/>
           </a:p>
@@ -9282,7 +8157,7 @@
           <a:p>
             <a:fld id="{869A38CF-E133-2243-90F7-979D11E866BA}" type="datetime4">
               <a:rPr lang="en-US" smtClean="0"/>
-              <a:t>April 21, 2018</a:t>
+              <a:t>April 23, 2018</a:t>
             </a:fld>
             <a:endParaRPr lang="en-CA" dirty="0"/>
           </a:p>
@@ -9506,7 +8381,7 @@
           <a:p>
             <a:fld id="{869A38CF-E133-2243-90F7-979D11E866BA}" type="datetime4">
               <a:rPr lang="en-US" smtClean="0"/>
-              <a:t>April 22, 2018</a:t>
+              <a:t>April 23, 2018</a:t>
             </a:fld>
             <a:endParaRPr lang="en-CA" dirty="0"/>
           </a:p>
@@ -9717,7 +8592,7 @@
           <a:p>
             <a:fld id="{869A38CF-E133-2243-90F7-979D11E866BA}" type="datetime4">
               <a:rPr lang="en-US" smtClean="0"/>
-              <a:t>April 21, 2018</a:t>
+              <a:t>April 23, 2018</a:t>
             </a:fld>
             <a:endParaRPr lang="en-CA" dirty="0"/>
           </a:p>
@@ -9992,7 +8867,7 @@
           <a:p>
             <a:fld id="{869A38CF-E133-2243-90F7-979D11E866BA}" type="datetime4">
               <a:rPr lang="en-US" smtClean="0"/>
-              <a:t>April 22, 2018</a:t>
+              <a:t>April 23, 2018</a:t>
             </a:fld>
             <a:endParaRPr lang="en-CA" dirty="0"/>
           </a:p>
@@ -10052,7 +8927,7 @@
         </p:spPr>
         <p:txBody>
           <a:bodyPr>
-            <a:normAutofit lnSpcReduction="10000"/>
+            <a:normAutofit/>
           </a:bodyPr>
           <a:lstStyle/>
           <a:p>
@@ -10116,12 +8991,6 @@
               <a:t>uniq</a:t>
             </a:r>
             <a:endParaRPr lang="en-US" sz="2800" dirty="0"/>
-          </a:p>
-          <a:p>
-            <a:r>
-              <a:rPr lang="en-US" sz="2800" dirty="0"/>
-              <a:t>What account was used in an attack over the SMB protocol?</a:t>
-            </a:r>
           </a:p>
           <a:p>
             <a:endParaRPr lang="en-US" sz="2800" dirty="0"/>
@@ -10219,7 +9088,7 @@
           <a:p>
             <a:fld id="{869A38CF-E133-2243-90F7-979D11E866BA}" type="datetime4">
               <a:rPr lang="en-US" smtClean="0"/>
-              <a:t>April 22, 2018</a:t>
+              <a:t>April 23, 2018</a:t>
             </a:fld>
             <a:endParaRPr lang="en-CA" dirty="0"/>
           </a:p>
@@ -11017,7 +9886,7 @@
           <a:p>
             <a:fld id="{869A38CF-E133-2243-90F7-979D11E866BA}" type="datetime4">
               <a:rPr lang="en-US" smtClean="0"/>
-              <a:t>April 22, 2018</a:t>
+              <a:t>April 23, 2018</a:t>
             </a:fld>
             <a:endParaRPr lang="en-CA" dirty="0"/>
           </a:p>
@@ -11534,7 +10403,7 @@
           <a:p>
             <a:fld id="{869A38CF-E133-2243-90F7-979D11E866BA}" type="datetime4">
               <a:rPr lang="en-US" smtClean="0"/>
-              <a:t>April 22, 2018</a:t>
+              <a:t>April 23, 2018</a:t>
             </a:fld>
             <a:endParaRPr lang="en-CA" dirty="0"/>
           </a:p>
@@ -11698,7 +10567,7 @@
           <a:p>
             <a:fld id="{869A38CF-E133-2243-90F7-979D11E866BA}" type="datetime4">
               <a:rPr lang="en-US" smtClean="0"/>
-              <a:t>April 21, 2018</a:t>
+              <a:t>April 23, 2018</a:t>
             </a:fld>
             <a:endParaRPr lang="en-CA" dirty="0"/>
           </a:p>
@@ -11871,7 +10740,7 @@
           <a:p>
             <a:fld id="{869A38CF-E133-2243-90F7-979D11E866BA}" type="datetime4">
               <a:rPr lang="en-US" smtClean="0"/>
-              <a:t>April 21, 2018</a:t>
+              <a:t>April 23, 2018</a:t>
             </a:fld>
             <a:endParaRPr lang="en-CA" dirty="0"/>
           </a:p>
@@ -12115,7 +10984,7 @@
           <a:p>
             <a:fld id="{869A38CF-E133-2243-90F7-979D11E866BA}" type="datetime4">
               <a:rPr lang="en-US" smtClean="0"/>
-              <a:t>April 21, 2018</a:t>
+              <a:t>April 23, 2018</a:t>
             </a:fld>
             <a:endParaRPr lang="en-CA" dirty="0"/>
           </a:p>
@@ -12233,7 +11102,7 @@
           <a:p>
             <a:fld id="{869A38CF-E133-2243-90F7-979D11E866BA}" type="datetime4">
               <a:rPr lang="en-US" smtClean="0"/>
-              <a:t>April 21, 2018</a:t>
+              <a:t>April 23, 2018</a:t>
             </a:fld>
             <a:endParaRPr lang="en-CA" dirty="0"/>
           </a:p>
@@ -12287,7 +11156,7 @@
         </p:nvSpPr>
         <p:spPr>
           <a:xfrm>
-            <a:off x="648672" y="1504949"/>
+            <a:off x="648672" y="1035119"/>
             <a:ext cx="7885728" cy="3171982"/>
           </a:xfrm>
         </p:spPr>
@@ -12314,39 +11183,6 @@
             </a:r>
           </a:p>
           <a:p>
-            <a:r>
-              <a:rPr lang="en-US" sz="2800" dirty="0"/>
-              <a:t>Flag 2</a:t>
-            </a:r>
-          </a:p>
-          <a:p>
-            <a:pPr lvl="1"/>
-            <a:r>
-              <a:rPr lang="en-US" sz="2800" dirty="0" err="1"/>
-              <a:t>ngrep</a:t>
-            </a:r>
-            <a:r>
-              <a:rPr lang="en-US" sz="2800" dirty="0"/>
-              <a:t> -</a:t>
-            </a:r>
-            <a:r>
-              <a:rPr lang="en-US" sz="2800" dirty="0" err="1"/>
-              <a:t>qI</a:t>
-            </a:r>
-            <a:r>
-              <a:rPr lang="en-US" sz="2800" dirty="0"/>
-              <a:t> </a:t>
-            </a:r>
-            <a:r>
-              <a:rPr lang="en-US" sz="2800" dirty="0" err="1"/>
-              <a:t>packet_intro.pcap</a:t>
-            </a:r>
-            <a:r>
-              <a:rPr lang="en-US" sz="2800" dirty="0"/>
-              <a:t> ‘flag2’</a:t>
-            </a:r>
-          </a:p>
-          <a:p>
             <a:endParaRPr lang="en-US" sz="2800" dirty="0"/>
           </a:p>
           <a:p>
@@ -12356,10 +11192,10 @@
       </p:sp>
       <p:pic>
         <p:nvPicPr>
-          <p:cNvPr id="3" name="Picture 2">
+          <p:cNvPr id="6" name="Picture 5">
             <a:extLst>
               <a:ext uri="{FF2B5EF4-FFF2-40B4-BE49-F238E27FC236}">
-                <a16:creationId xmlns:a16="http://schemas.microsoft.com/office/drawing/2014/main" id="{E3DFDA39-9182-4D23-8A71-D88394EC5797}"/>
+                <a16:creationId xmlns:a16="http://schemas.microsoft.com/office/drawing/2014/main" id="{9ADFD5C5-433A-40F0-B1E5-8956A9B3643F}"/>
               </a:ext>
             </a:extLst>
           </p:cNvPr>
@@ -12376,8 +11212,8 @@
         </p:blipFill>
         <p:spPr>
           <a:xfrm>
-            <a:off x="311222" y="2823143"/>
-            <a:ext cx="8338675" cy="1964923"/>
+            <a:off x="2272256" y="1880136"/>
+            <a:ext cx="4638560" cy="2720868"/>
           </a:xfrm>
           <a:prstGeom prst="rect">
             <a:avLst/>
@@ -12466,7 +11302,7 @@
           <a:p>
             <a:fld id="{869A38CF-E133-2243-90F7-979D11E866BA}" type="datetime4">
               <a:rPr lang="en-US" smtClean="0"/>
-              <a:t>April 21, 2018</a:t>
+              <a:t>April 23, 2018</a:t>
             </a:fld>
             <a:endParaRPr lang="en-CA" dirty="0"/>
           </a:p>
@@ -12682,7 +11518,7 @@
           <a:p>
             <a:fld id="{869A38CF-E133-2243-90F7-979D11E866BA}" type="datetime4">
               <a:rPr lang="en-US" smtClean="0"/>
-              <a:t>April 21, 2018</a:t>
+              <a:t>April 23, 2018</a:t>
             </a:fld>
             <a:endParaRPr lang="en-CA" dirty="0"/>
           </a:p>
@@ -12876,7 +11712,7 @@
           <a:p>
             <a:fld id="{869A38CF-E133-2243-90F7-979D11E866BA}" type="datetime4">
               <a:rPr lang="en-US" smtClean="0"/>
-              <a:t>April 21, 2018</a:t>
+              <a:t>April 23, 2018</a:t>
             </a:fld>
             <a:endParaRPr lang="en-CA" dirty="0"/>
           </a:p>
@@ -13122,7 +11958,7 @@
           <a:p>
             <a:fld id="{869A38CF-E133-2243-90F7-979D11E866BA}" type="datetime4">
               <a:rPr lang="en-US" smtClean="0"/>
-              <a:t>April 21, 2018</a:t>
+              <a:t>April 23, 2018</a:t>
             </a:fld>
             <a:endParaRPr lang="en-CA" dirty="0"/>
           </a:p>
@@ -13302,7 +12138,7 @@
           <a:p>
             <a:fld id="{869A38CF-E133-2243-90F7-979D11E866BA}" type="datetime4">
               <a:rPr lang="en-US" smtClean="0"/>
-              <a:t>April 21, 2018</a:t>
+              <a:t>April 23, 2018</a:t>
             </a:fld>
             <a:endParaRPr lang="en-CA" dirty="0"/>
           </a:p>
@@ -13489,7 +12325,7 @@
           <a:p>
             <a:fld id="{869A38CF-E133-2243-90F7-979D11E866BA}" type="datetime4">
               <a:rPr lang="en-US" smtClean="0"/>
-              <a:t>April 21, 2018</a:t>
+              <a:t>April 23, 2018</a:t>
             </a:fld>
             <a:endParaRPr lang="en-CA" dirty="0"/>
           </a:p>
@@ -13662,7 +12498,7 @@
           <a:p>
             <a:fld id="{869A38CF-E133-2243-90F7-979D11E866BA}" type="datetime4">
               <a:rPr lang="en-US" smtClean="0"/>
-              <a:t>April 21, 2018</a:t>
+              <a:t>April 23, 2018</a:t>
             </a:fld>
             <a:endParaRPr lang="en-CA" dirty="0"/>
           </a:p>
@@ -13823,7 +12659,7 @@
           <a:p>
             <a:fld id="{869A38CF-E133-2243-90F7-979D11E866BA}" type="datetime4">
               <a:rPr lang="en-US" smtClean="0"/>
-              <a:t>April 21, 2018</a:t>
+              <a:t>April 23, 2018</a:t>
             </a:fld>
             <a:endParaRPr lang="en-CA" dirty="0"/>
           </a:p>
@@ -13996,7 +12832,7 @@
           <a:p>
             <a:fld id="{869A38CF-E133-2243-90F7-979D11E866BA}" type="datetime4">
               <a:rPr lang="en-US" smtClean="0"/>
-              <a:t>April 21, 2018</a:t>
+              <a:t>April 23, 2018</a:t>
             </a:fld>
             <a:endParaRPr lang="en-CA" dirty="0"/>
           </a:p>
@@ -14156,7 +12992,7 @@
           <a:p>
             <a:fld id="{869A38CF-E133-2243-90F7-979D11E866BA}" type="datetime4">
               <a:rPr lang="en-US" smtClean="0"/>
-              <a:t>April 21, 2018</a:t>
+              <a:t>April 23, 2018</a:t>
             </a:fld>
             <a:endParaRPr lang="en-CA" dirty="0"/>
           </a:p>
@@ -14445,7 +13281,7 @@
           <a:p>
             <a:fld id="{869A38CF-E133-2243-90F7-979D11E866BA}" type="datetime4">
               <a:rPr lang="en-US" smtClean="0"/>
-              <a:t>April 21, 2018</a:t>
+              <a:t>April 23, 2018</a:t>
             </a:fld>
             <a:endParaRPr lang="en-CA" dirty="0"/>
           </a:p>
@@ -14502,7 +13338,7 @@
           <a:bodyPr/>
           <a:lstStyle/>
           <a:p>
-            <a:endParaRPr lang="en-US"/>
+            <a:endParaRPr lang="en-US" dirty="0"/>
           </a:p>
         </p:txBody>
       </p:sp>
@@ -14617,7 +13453,7 @@
           <a:p>
             <a:fld id="{869A38CF-E133-2243-90F7-979D11E866BA}" type="datetime4">
               <a:rPr lang="en-US" smtClean="0"/>
-              <a:t>April 21, 2018</a:t>
+              <a:t>April 23, 2018</a:t>
             </a:fld>
             <a:endParaRPr lang="en-CA" dirty="0"/>
           </a:p>
@@ -14818,7 +13654,7 @@
           <a:p>
             <a:fld id="{869A38CF-E133-2243-90F7-979D11E866BA}" type="datetime4">
               <a:rPr lang="en-US" smtClean="0"/>
-              <a:t>April 21, 2018</a:t>
+              <a:t>April 23, 2018</a:t>
             </a:fld>
             <a:endParaRPr lang="en-CA" dirty="0"/>
           </a:p>
@@ -15065,7 +13901,7 @@
           <a:p>
             <a:fld id="{869A38CF-E133-2243-90F7-979D11E866BA}" type="datetime4">
               <a:rPr lang="en-US" smtClean="0"/>
-              <a:t>April 21, 2018</a:t>
+              <a:t>April 23, 2018</a:t>
             </a:fld>
             <a:endParaRPr lang="en-CA" dirty="0"/>
           </a:p>
@@ -15312,7 +14148,7 @@
           <a:p>
             <a:fld id="{869A38CF-E133-2243-90F7-979D11E866BA}" type="datetime4">
               <a:rPr lang="en-US" smtClean="0"/>
-              <a:t>April 21, 2018</a:t>
+              <a:t>April 23, 2018</a:t>
             </a:fld>
             <a:endParaRPr lang="en-CA" dirty="0"/>
           </a:p>
@@ -15650,7 +14486,7 @@
           <a:p>
             <a:fld id="{869A38CF-E133-2243-90F7-979D11E866BA}" type="datetime4">
               <a:rPr lang="en-US" smtClean="0"/>
-              <a:t>April 21, 2018</a:t>
+              <a:t>April 23, 2018</a:t>
             </a:fld>
             <a:endParaRPr lang="en-CA" dirty="0"/>
           </a:p>
@@ -15915,7 +14751,7 @@
           <a:p>
             <a:fld id="{869A38CF-E133-2243-90F7-979D11E866BA}" type="datetime4">
               <a:rPr lang="en-US" smtClean="0"/>
-              <a:t>April 21, 2018</a:t>
+              <a:t>April 23, 2018</a:t>
             </a:fld>
             <a:endParaRPr lang="en-CA" dirty="0"/>
           </a:p>
@@ -16835,6 +15671,15 @@
 </file>
 
 <file path=customXml/item1.xml><?xml version="1.0" encoding="utf-8"?>
+<?mso-contentType ?>
+<FormTemplates xmlns="http://schemas.microsoft.com/sharepoint/v3/contenttype/forms">
+  <Display>DocumentLibraryForm</Display>
+  <Edit>DocumentLibraryForm</Edit>
+  <New>DocumentLibraryForm</New>
+</FormTemplates>
+</file>
+
+<file path=customXml/item2.xml><?xml version="1.0" encoding="utf-8"?>
 <ct:contentTypeSchema xmlns:ct="http://schemas.microsoft.com/office/2006/metadata/contentType" xmlns:ma="http://schemas.microsoft.com/office/2006/metadata/properties/metaAttributes" ct:_="" ma:_="" ma:contentTypeName="Document" ma:contentTypeID="0x01010009B63D44CCE4914BB34183B062CF6FE1" ma:contentTypeVersion="4" ma:contentTypeDescription="Create a new document." ma:contentTypeScope="" ma:versionID="372159b7c420614f5a61c5a69b0e8b03">
   <xsd:schema xmlns:xsd="http://www.w3.org/2001/XMLSchema" xmlns:xs="http://www.w3.org/2001/XMLSchema" xmlns:p="http://schemas.microsoft.com/office/2006/metadata/properties" xmlns:ns2="3731b75e-6f68-40f4-9d0a-0a5cf2200f93" targetNamespace="http://schemas.microsoft.com/office/2006/metadata/properties" ma:root="true" ma:fieldsID="d64b5b83b0766b47035683cfca990c54" ns2:_="">
     <xsd:import namespace="3731b75e-6f68-40f4-9d0a-0a5cf2200f93"/>
@@ -16996,15 +15841,6 @@
 </ct:contentTypeSchema>
 </file>
 
-<file path=customXml/item2.xml><?xml version="1.0" encoding="utf-8"?>
-<?mso-contentType ?>
-<FormTemplates xmlns="http://schemas.microsoft.com/sharepoint/v3/contenttype/forms">
-  <Display>DocumentLibraryForm</Display>
-  <Edit>DocumentLibraryForm</Edit>
-  <New>DocumentLibraryForm</New>
-</FormTemplates>
-</file>
-
 <file path=customXml/item3.xml><?xml version="1.0" encoding="utf-8"?>
 <p:properties xmlns:p="http://schemas.microsoft.com/office/2006/metadata/properties" xmlns:xsi="http://www.w3.org/2001/XMLSchema-instance" xmlns:pc="http://schemas.microsoft.com/office/infopath/2007/PartnerControls">
   <documentManagement/>
@@ -17012,6 +15848,14 @@
 </file>
 
 <file path=customXml/itemProps1.xml><?xml version="1.0" encoding="utf-8"?>
+<ds:datastoreItem xmlns:ds="http://schemas.openxmlformats.org/officeDocument/2006/customXml" ds:itemID="{C809629B-DAAE-43CD-9923-A162774A4306}">
+  <ds:schemaRefs>
+    <ds:schemaRef ds:uri="http://schemas.microsoft.com/sharepoint/v3/contenttype/forms"/>
+  </ds:schemaRefs>
+</ds:datastoreItem>
+</file>
+
+<file path=customXml/itemProps2.xml><?xml version="1.0" encoding="utf-8"?>
 <ds:datastoreItem xmlns:ds="http://schemas.openxmlformats.org/officeDocument/2006/customXml" ds:itemID="{A5B99817-A09C-4D50-BB92-742174BE120E}">
   <ds:schemaRefs>
     <ds:schemaRef ds:uri="http://schemas.microsoft.com/office/2006/metadata/contentType"/>
@@ -17029,26 +15873,18 @@
 </ds:datastoreItem>
 </file>
 
-<file path=customXml/itemProps2.xml><?xml version="1.0" encoding="utf-8"?>
-<ds:datastoreItem xmlns:ds="http://schemas.openxmlformats.org/officeDocument/2006/customXml" ds:itemID="{C809629B-DAAE-43CD-9923-A162774A4306}">
-  <ds:schemaRefs>
-    <ds:schemaRef ds:uri="http://schemas.microsoft.com/sharepoint/v3/contenttype/forms"/>
-  </ds:schemaRefs>
-</ds:datastoreItem>
-</file>
-
 <file path=customXml/itemProps3.xml><?xml version="1.0" encoding="utf-8"?>
 <ds:datastoreItem xmlns:ds="http://schemas.openxmlformats.org/officeDocument/2006/customXml" ds:itemID="{0BBB757E-0932-4635-8D18-732DEBB5D1F8}">
   <ds:schemaRefs>
+    <ds:schemaRef ds:uri="http://purl.org/dc/dcmitype/"/>
     <ds:schemaRef ds:uri="http://schemas.microsoft.com/office/infopath/2007/PartnerControls"/>
     <ds:schemaRef ds:uri="http://purl.org/dc/elements/1.1/"/>
     <ds:schemaRef ds:uri="http://schemas.microsoft.com/office/2006/metadata/properties"/>
     <ds:schemaRef ds:uri="http://purl.org/dc/terms/"/>
+    <ds:schemaRef ds:uri="http://schemas.microsoft.com/office/2006/documentManagement/types"/>
+    <ds:schemaRef ds:uri="3731b75e-6f68-40f4-9d0a-0a5cf2200f93"/>
     <ds:schemaRef ds:uri="http://schemas.openxmlformats.org/package/2006/metadata/core-properties"/>
-    <ds:schemaRef ds:uri="3731b75e-6f68-40f4-9d0a-0a5cf2200f93"/>
-    <ds:schemaRef ds:uri="http://schemas.microsoft.com/office/2006/documentManagement/types"/>
     <ds:schemaRef ds:uri="http://www.w3.org/XML/1998/namespace"/>
-    <ds:schemaRef ds:uri="http://purl.org/dc/dcmitype/"/>
   </ds:schemaRefs>
 </ds:datastoreItem>
 </file>
</xml_diff>